<commit_message>
Update dev section of manual for dipole geometry calculation.
</commit_message>
<xml_diff>
--- a/manual/source/dev_figures/dipole_parameterisation.pptx
+++ b/manual/source/dev_figures/dipole_parameterisation.pptx
@@ -2,19 +2,19 @@
 <file path=ppt/presentation.xml><?xml version="1.0" encoding="utf-8"?>
 <p:presentation xmlns:a="http://schemas.openxmlformats.org/drawingml/2006/main" xmlns:r="http://schemas.openxmlformats.org/officeDocument/2006/relationships" xmlns:p="http://schemas.openxmlformats.org/presentationml/2006/main" saveSubsetFonts="1" autoCompressPictures="0">
   <p:sldMasterIdLst>
-    <p:sldMasterId id="2147483684" r:id="rId1"/>
+    <p:sldMasterId id="2147483696" r:id="rId1"/>
   </p:sldMasterIdLst>
   <p:sldIdLst>
     <p:sldId id="257" r:id="rId2"/>
   </p:sldIdLst>
-  <p:sldSz cx="7559675" cy="6858000"/>
+  <p:sldSz cx="4319588" cy="4319588"/>
   <p:notesSz cx="6858000" cy="9144000"/>
   <p:defaultTextStyle>
     <a:defPPr>
       <a:defRPr lang="en-US"/>
     </a:defPPr>
-    <a:lvl1pPr marL="0" algn="l" defTabSz="914400" rtl="0" eaLnBrk="1" latinLnBrk="0" hangingPunct="1">
-      <a:defRPr sz="1800" kern="1200">
+    <a:lvl1pPr marL="0" algn="l" defTabSz="547908" rtl="0" eaLnBrk="1" latinLnBrk="0" hangingPunct="1">
+      <a:defRPr sz="1079" kern="1200">
         <a:solidFill>
           <a:schemeClr val="tx1"/>
         </a:solidFill>
@@ -23,8 +23,8 @@
         <a:cs typeface="+mn-cs"/>
       </a:defRPr>
     </a:lvl1pPr>
-    <a:lvl2pPr marL="457200" algn="l" defTabSz="914400" rtl="0" eaLnBrk="1" latinLnBrk="0" hangingPunct="1">
-      <a:defRPr sz="1800" kern="1200">
+    <a:lvl2pPr marL="273954" algn="l" defTabSz="547908" rtl="0" eaLnBrk="1" latinLnBrk="0" hangingPunct="1">
+      <a:defRPr sz="1079" kern="1200">
         <a:solidFill>
           <a:schemeClr val="tx1"/>
         </a:solidFill>
@@ -33,8 +33,8 @@
         <a:cs typeface="+mn-cs"/>
       </a:defRPr>
     </a:lvl2pPr>
-    <a:lvl3pPr marL="914400" algn="l" defTabSz="914400" rtl="0" eaLnBrk="1" latinLnBrk="0" hangingPunct="1">
-      <a:defRPr sz="1800" kern="1200">
+    <a:lvl3pPr marL="547908" algn="l" defTabSz="547908" rtl="0" eaLnBrk="1" latinLnBrk="0" hangingPunct="1">
+      <a:defRPr sz="1079" kern="1200">
         <a:solidFill>
           <a:schemeClr val="tx1"/>
         </a:solidFill>
@@ -43,8 +43,8 @@
         <a:cs typeface="+mn-cs"/>
       </a:defRPr>
     </a:lvl3pPr>
-    <a:lvl4pPr marL="1371600" algn="l" defTabSz="914400" rtl="0" eaLnBrk="1" latinLnBrk="0" hangingPunct="1">
-      <a:defRPr sz="1800" kern="1200">
+    <a:lvl4pPr marL="821863" algn="l" defTabSz="547908" rtl="0" eaLnBrk="1" latinLnBrk="0" hangingPunct="1">
+      <a:defRPr sz="1079" kern="1200">
         <a:solidFill>
           <a:schemeClr val="tx1"/>
         </a:solidFill>
@@ -53,8 +53,8 @@
         <a:cs typeface="+mn-cs"/>
       </a:defRPr>
     </a:lvl4pPr>
-    <a:lvl5pPr marL="1828800" algn="l" defTabSz="914400" rtl="0" eaLnBrk="1" latinLnBrk="0" hangingPunct="1">
-      <a:defRPr sz="1800" kern="1200">
+    <a:lvl5pPr marL="1095817" algn="l" defTabSz="547908" rtl="0" eaLnBrk="1" latinLnBrk="0" hangingPunct="1">
+      <a:defRPr sz="1079" kern="1200">
         <a:solidFill>
           <a:schemeClr val="tx1"/>
         </a:solidFill>
@@ -63,8 +63,8 @@
         <a:cs typeface="+mn-cs"/>
       </a:defRPr>
     </a:lvl5pPr>
-    <a:lvl6pPr marL="2286000" algn="l" defTabSz="914400" rtl="0" eaLnBrk="1" latinLnBrk="0" hangingPunct="1">
-      <a:defRPr sz="1800" kern="1200">
+    <a:lvl6pPr marL="1369771" algn="l" defTabSz="547908" rtl="0" eaLnBrk="1" latinLnBrk="0" hangingPunct="1">
+      <a:defRPr sz="1079" kern="1200">
         <a:solidFill>
           <a:schemeClr val="tx1"/>
         </a:solidFill>
@@ -73,8 +73,8 @@
         <a:cs typeface="+mn-cs"/>
       </a:defRPr>
     </a:lvl6pPr>
-    <a:lvl7pPr marL="2743200" algn="l" defTabSz="914400" rtl="0" eaLnBrk="1" latinLnBrk="0" hangingPunct="1">
-      <a:defRPr sz="1800" kern="1200">
+    <a:lvl7pPr marL="1643725" algn="l" defTabSz="547908" rtl="0" eaLnBrk="1" latinLnBrk="0" hangingPunct="1">
+      <a:defRPr sz="1079" kern="1200">
         <a:solidFill>
           <a:schemeClr val="tx1"/>
         </a:solidFill>
@@ -83,8 +83,8 @@
         <a:cs typeface="+mn-cs"/>
       </a:defRPr>
     </a:lvl7pPr>
-    <a:lvl8pPr marL="3200400" algn="l" defTabSz="914400" rtl="0" eaLnBrk="1" latinLnBrk="0" hangingPunct="1">
-      <a:defRPr sz="1800" kern="1200">
+    <a:lvl8pPr marL="1917680" algn="l" defTabSz="547908" rtl="0" eaLnBrk="1" latinLnBrk="0" hangingPunct="1">
+      <a:defRPr sz="1079" kern="1200">
         <a:solidFill>
           <a:schemeClr val="tx1"/>
         </a:solidFill>
@@ -93,8 +93,8 @@
         <a:cs typeface="+mn-cs"/>
       </a:defRPr>
     </a:lvl8pPr>
-    <a:lvl9pPr marL="3657600" algn="l" defTabSz="914400" rtl="0" eaLnBrk="1" latinLnBrk="0" hangingPunct="1">
-      <a:defRPr sz="1800" kern="1200">
+    <a:lvl9pPr marL="2191634" algn="l" defTabSz="547908" rtl="0" eaLnBrk="1" latinLnBrk="0" hangingPunct="1">
+      <a:defRPr sz="1079" kern="1200">
         <a:solidFill>
           <a:schemeClr val="tx1"/>
         </a:solidFill>
@@ -107,12 +107,12 @@
   <p:extLst>
     <p:ext uri="{EFAFB233-063F-42B5-8137-9DF3F51BA10A}">
       <p15:sldGuideLst xmlns:p15="http://schemas.microsoft.com/office/powerpoint/2012/main">
-        <p15:guide id="1" orient="horz" pos="2160" userDrawn="1">
+        <p15:guide id="1" orient="horz" pos="1361" userDrawn="1">
           <p15:clr>
             <a:srgbClr val="A4A3A4"/>
           </p15:clr>
         </p15:guide>
-        <p15:guide id="2" pos="2381" userDrawn="1">
+        <p15:guide id="2" pos="1361" userDrawn="1">
           <p15:clr>
             <a:srgbClr val="A4A3A4"/>
           </p15:clr>
@@ -152,15 +152,15 @@
         </p:nvSpPr>
         <p:spPr>
           <a:xfrm>
-            <a:off x="566976" y="1122363"/>
-            <a:ext cx="6425724" cy="2387600"/>
+            <a:off x="323969" y="706933"/>
+            <a:ext cx="3671650" cy="1503857"/>
           </a:xfrm>
         </p:spPr>
         <p:txBody>
           <a:bodyPr anchor="b"/>
           <a:lstStyle>
             <a:lvl1pPr algn="ctr">
-              <a:defRPr sz="4960"/>
+              <a:defRPr sz="2834"/>
             </a:lvl1pPr>
           </a:lstStyle>
           <a:p>
@@ -184,8 +184,8 @@
         </p:nvSpPr>
         <p:spPr>
           <a:xfrm>
-            <a:off x="944960" y="3602038"/>
-            <a:ext cx="5669756" cy="1655762"/>
+            <a:off x="539949" y="2268784"/>
+            <a:ext cx="3239691" cy="1042900"/>
           </a:xfrm>
         </p:spPr>
         <p:txBody>
@@ -193,39 +193,39 @@
           <a:lstStyle>
             <a:lvl1pPr marL="0" indent="0" algn="ctr">
               <a:buNone/>
-              <a:defRPr sz="1984"/>
+              <a:defRPr sz="1134"/>
             </a:lvl1pPr>
-            <a:lvl2pPr marL="377967" indent="0" algn="ctr">
+            <a:lvl2pPr marL="215981" indent="0" algn="ctr">
               <a:buNone/>
-              <a:defRPr sz="1653"/>
+              <a:defRPr sz="945"/>
             </a:lvl2pPr>
-            <a:lvl3pPr marL="755934" indent="0" algn="ctr">
+            <a:lvl3pPr marL="431963" indent="0" algn="ctr">
               <a:buNone/>
-              <a:defRPr sz="1488"/>
+              <a:defRPr sz="850"/>
             </a:lvl3pPr>
-            <a:lvl4pPr marL="1133902" indent="0" algn="ctr">
+            <a:lvl4pPr marL="647944" indent="0" algn="ctr">
               <a:buNone/>
-              <a:defRPr sz="1323"/>
+              <a:defRPr sz="756"/>
             </a:lvl4pPr>
-            <a:lvl5pPr marL="1511869" indent="0" algn="ctr">
+            <a:lvl5pPr marL="863925" indent="0" algn="ctr">
               <a:buNone/>
-              <a:defRPr sz="1323"/>
+              <a:defRPr sz="756"/>
             </a:lvl5pPr>
-            <a:lvl6pPr marL="1889836" indent="0" algn="ctr">
+            <a:lvl6pPr marL="1079906" indent="0" algn="ctr">
               <a:buNone/>
-              <a:defRPr sz="1323"/>
+              <a:defRPr sz="756"/>
             </a:lvl6pPr>
-            <a:lvl7pPr marL="2267803" indent="0" algn="ctr">
+            <a:lvl7pPr marL="1295888" indent="0" algn="ctr">
               <a:buNone/>
-              <a:defRPr sz="1323"/>
+              <a:defRPr sz="756"/>
             </a:lvl7pPr>
-            <a:lvl8pPr marL="2645771" indent="0" algn="ctr">
+            <a:lvl8pPr marL="1511869" indent="0" algn="ctr">
               <a:buNone/>
-              <a:defRPr sz="1323"/>
+              <a:defRPr sz="756"/>
             </a:lvl8pPr>
-            <a:lvl9pPr marL="3023738" indent="0" algn="ctr">
+            <a:lvl9pPr marL="1727850" indent="0" algn="ctr">
               <a:buNone/>
-              <a:defRPr sz="1323"/>
+              <a:defRPr sz="756"/>
             </a:lvl9pPr>
           </a:lstStyle>
           <a:p>
@@ -254,7 +254,7 @@
           <a:p>
             <a:fld id="{BCC74062-80F2-D242-BFAA-677F0420BFA2}" type="datetimeFigureOut">
               <a:rPr lang="en-GB" smtClean="0"/>
-              <a:t>22/12/2017</a:t>
+              <a:t>24/07/2018</a:t>
             </a:fld>
             <a:endParaRPr lang="en-GB"/>
           </a:p>
@@ -419,7 +419,7 @@
           <a:p>
             <a:fld id="{BCC74062-80F2-D242-BFAA-677F0420BFA2}" type="datetimeFigureOut">
               <a:rPr lang="en-GB" smtClean="0"/>
-              <a:t>22/12/2017</a:t>
+              <a:t>24/07/2018</a:t>
             </a:fld>
             <a:endParaRPr lang="en-GB"/>
           </a:p>
@@ -504,8 +504,8 @@
         </p:nvSpPr>
         <p:spPr>
           <a:xfrm>
-            <a:off x="5409893" y="365125"/>
-            <a:ext cx="1630055" cy="5811838"/>
+            <a:off x="3091205" y="229978"/>
+            <a:ext cx="931411" cy="3660651"/>
           </a:xfrm>
         </p:spPr>
         <p:txBody>
@@ -532,8 +532,8 @@
         </p:nvSpPr>
         <p:spPr>
           <a:xfrm>
-            <a:off x="519728" y="365125"/>
-            <a:ext cx="4795669" cy="5811838"/>
+            <a:off x="296972" y="229978"/>
+            <a:ext cx="2740239" cy="3660651"/>
           </a:xfrm>
         </p:spPr>
         <p:txBody>
@@ -594,7 +594,7 @@
           <a:p>
             <a:fld id="{BCC74062-80F2-D242-BFAA-677F0420BFA2}" type="datetimeFigureOut">
               <a:rPr lang="en-GB" smtClean="0"/>
-              <a:t>22/12/2017</a:t>
+              <a:t>24/07/2018</a:t>
             </a:fld>
             <a:endParaRPr lang="en-GB"/>
           </a:p>
@@ -759,7 +759,7 @@
           <a:p>
             <a:fld id="{BCC74062-80F2-D242-BFAA-677F0420BFA2}" type="datetimeFigureOut">
               <a:rPr lang="en-GB" smtClean="0"/>
-              <a:t>22/12/2017</a:t>
+              <a:t>24/07/2018</a:t>
             </a:fld>
             <a:endParaRPr lang="en-GB"/>
           </a:p>
@@ -844,15 +844,15 @@
         </p:nvSpPr>
         <p:spPr>
           <a:xfrm>
-            <a:off x="515791" y="1709740"/>
-            <a:ext cx="6520220" cy="2852737"/>
+            <a:off x="294722" y="1076899"/>
+            <a:ext cx="3725645" cy="1796828"/>
           </a:xfrm>
         </p:spPr>
         <p:txBody>
           <a:bodyPr anchor="b"/>
           <a:lstStyle>
             <a:lvl1pPr>
-              <a:defRPr sz="4960"/>
+              <a:defRPr sz="2834"/>
             </a:lvl1pPr>
           </a:lstStyle>
           <a:p>
@@ -876,8 +876,8 @@
         </p:nvSpPr>
         <p:spPr>
           <a:xfrm>
-            <a:off x="515791" y="4589465"/>
-            <a:ext cx="6520220" cy="1500187"/>
+            <a:off x="294722" y="2890725"/>
+            <a:ext cx="3725645" cy="944910"/>
           </a:xfrm>
         </p:spPr>
         <p:txBody>
@@ -885,15 +885,15 @@
           <a:lstStyle>
             <a:lvl1pPr marL="0" indent="0">
               <a:buNone/>
-              <a:defRPr sz="1984">
+              <a:defRPr sz="1134">
                 <a:solidFill>
                   <a:schemeClr val="tx1"/>
                 </a:solidFill>
               </a:defRPr>
             </a:lvl1pPr>
-            <a:lvl2pPr marL="377967" indent="0">
+            <a:lvl2pPr marL="215981" indent="0">
               <a:buNone/>
-              <a:defRPr sz="1653">
+              <a:defRPr sz="945">
                 <a:solidFill>
                   <a:schemeClr val="tx1">
                     <a:tint val="75000"/>
@@ -901,9 +901,9 @@
                 </a:solidFill>
               </a:defRPr>
             </a:lvl2pPr>
-            <a:lvl3pPr marL="755934" indent="0">
+            <a:lvl3pPr marL="431963" indent="0">
               <a:buNone/>
-              <a:defRPr sz="1488">
+              <a:defRPr sz="850">
                 <a:solidFill>
                   <a:schemeClr val="tx1">
                     <a:tint val="75000"/>
@@ -911,9 +911,9 @@
                 </a:solidFill>
               </a:defRPr>
             </a:lvl3pPr>
-            <a:lvl4pPr marL="1133902" indent="0">
+            <a:lvl4pPr marL="647944" indent="0">
               <a:buNone/>
-              <a:defRPr sz="1323">
+              <a:defRPr sz="756">
                 <a:solidFill>
                   <a:schemeClr val="tx1">
                     <a:tint val="75000"/>
@@ -921,9 +921,9 @@
                 </a:solidFill>
               </a:defRPr>
             </a:lvl4pPr>
-            <a:lvl5pPr marL="1511869" indent="0">
+            <a:lvl5pPr marL="863925" indent="0">
               <a:buNone/>
-              <a:defRPr sz="1323">
+              <a:defRPr sz="756">
                 <a:solidFill>
                   <a:schemeClr val="tx1">
                     <a:tint val="75000"/>
@@ -931,9 +931,9 @@
                 </a:solidFill>
               </a:defRPr>
             </a:lvl5pPr>
-            <a:lvl6pPr marL="1889836" indent="0">
+            <a:lvl6pPr marL="1079906" indent="0">
               <a:buNone/>
-              <a:defRPr sz="1323">
+              <a:defRPr sz="756">
                 <a:solidFill>
                   <a:schemeClr val="tx1">
                     <a:tint val="75000"/>
@@ -941,9 +941,9 @@
                 </a:solidFill>
               </a:defRPr>
             </a:lvl6pPr>
-            <a:lvl7pPr marL="2267803" indent="0">
+            <a:lvl7pPr marL="1295888" indent="0">
               <a:buNone/>
-              <a:defRPr sz="1323">
+              <a:defRPr sz="756">
                 <a:solidFill>
                   <a:schemeClr val="tx1">
                     <a:tint val="75000"/>
@@ -951,9 +951,9 @@
                 </a:solidFill>
               </a:defRPr>
             </a:lvl7pPr>
-            <a:lvl8pPr marL="2645771" indent="0">
+            <a:lvl8pPr marL="1511869" indent="0">
               <a:buNone/>
-              <a:defRPr sz="1323">
+              <a:defRPr sz="756">
                 <a:solidFill>
                   <a:schemeClr val="tx1">
                     <a:tint val="75000"/>
@@ -961,9 +961,9 @@
                 </a:solidFill>
               </a:defRPr>
             </a:lvl8pPr>
-            <a:lvl9pPr marL="3023738" indent="0">
+            <a:lvl9pPr marL="1727850" indent="0">
               <a:buNone/>
-              <a:defRPr sz="1323">
+              <a:defRPr sz="756">
                 <a:solidFill>
                   <a:schemeClr val="tx1">
                     <a:tint val="75000"/>
@@ -998,7 +998,7 @@
           <a:p>
             <a:fld id="{BCC74062-80F2-D242-BFAA-677F0420BFA2}" type="datetimeFigureOut">
               <a:rPr lang="en-GB" smtClean="0"/>
-              <a:t>22/12/2017</a:t>
+              <a:t>24/07/2018</a:t>
             </a:fld>
             <a:endParaRPr lang="en-GB"/>
           </a:p>
@@ -1106,8 +1106,8 @@
         </p:nvSpPr>
         <p:spPr>
           <a:xfrm>
-            <a:off x="519728" y="1825625"/>
-            <a:ext cx="3212862" cy="4351338"/>
+            <a:off x="296972" y="1149890"/>
+            <a:ext cx="1835825" cy="2740739"/>
           </a:xfrm>
         </p:spPr>
         <p:txBody>
@@ -1163,8 +1163,8 @@
         </p:nvSpPr>
         <p:spPr>
           <a:xfrm>
-            <a:off x="3827085" y="1825625"/>
-            <a:ext cx="3212862" cy="4351338"/>
+            <a:off x="2186791" y="1149890"/>
+            <a:ext cx="1835825" cy="2740739"/>
           </a:xfrm>
         </p:spPr>
         <p:txBody>
@@ -1225,7 +1225,7 @@
           <a:p>
             <a:fld id="{BCC74062-80F2-D242-BFAA-677F0420BFA2}" type="datetimeFigureOut">
               <a:rPr lang="en-GB" smtClean="0"/>
-              <a:t>22/12/2017</a:t>
+              <a:t>24/07/2018</a:t>
             </a:fld>
             <a:endParaRPr lang="en-GB"/>
           </a:p>
@@ -1310,8 +1310,8 @@
         </p:nvSpPr>
         <p:spPr>
           <a:xfrm>
-            <a:off x="520712" y="365127"/>
-            <a:ext cx="6520220" cy="1325563"/>
+            <a:off x="297534" y="229979"/>
+            <a:ext cx="3725645" cy="834921"/>
           </a:xfrm>
         </p:spPr>
         <p:txBody>
@@ -1338,8 +1338,8 @@
         </p:nvSpPr>
         <p:spPr>
           <a:xfrm>
-            <a:off x="520713" y="1681163"/>
-            <a:ext cx="3198096" cy="823912"/>
+            <a:off x="297535" y="1058899"/>
+            <a:ext cx="1827388" cy="518950"/>
           </a:xfrm>
         </p:spPr>
         <p:txBody>
@@ -1347,39 +1347,39 @@
           <a:lstStyle>
             <a:lvl1pPr marL="0" indent="0">
               <a:buNone/>
-              <a:defRPr sz="1984" b="1"/>
+              <a:defRPr sz="1134" b="1"/>
             </a:lvl1pPr>
-            <a:lvl2pPr marL="377967" indent="0">
+            <a:lvl2pPr marL="215981" indent="0">
               <a:buNone/>
-              <a:defRPr sz="1653" b="1"/>
+              <a:defRPr sz="945" b="1"/>
             </a:lvl2pPr>
-            <a:lvl3pPr marL="755934" indent="0">
+            <a:lvl3pPr marL="431963" indent="0">
               <a:buNone/>
-              <a:defRPr sz="1488" b="1"/>
+              <a:defRPr sz="850" b="1"/>
             </a:lvl3pPr>
-            <a:lvl4pPr marL="1133902" indent="0">
+            <a:lvl4pPr marL="647944" indent="0">
               <a:buNone/>
-              <a:defRPr sz="1323" b="1"/>
+              <a:defRPr sz="756" b="1"/>
             </a:lvl4pPr>
-            <a:lvl5pPr marL="1511869" indent="0">
+            <a:lvl5pPr marL="863925" indent="0">
               <a:buNone/>
-              <a:defRPr sz="1323" b="1"/>
+              <a:defRPr sz="756" b="1"/>
             </a:lvl5pPr>
-            <a:lvl6pPr marL="1889836" indent="0">
+            <a:lvl6pPr marL="1079906" indent="0">
               <a:buNone/>
-              <a:defRPr sz="1323" b="1"/>
+              <a:defRPr sz="756" b="1"/>
             </a:lvl6pPr>
-            <a:lvl7pPr marL="2267803" indent="0">
+            <a:lvl7pPr marL="1295888" indent="0">
               <a:buNone/>
-              <a:defRPr sz="1323" b="1"/>
+              <a:defRPr sz="756" b="1"/>
             </a:lvl7pPr>
-            <a:lvl8pPr marL="2645771" indent="0">
+            <a:lvl8pPr marL="1511869" indent="0">
               <a:buNone/>
-              <a:defRPr sz="1323" b="1"/>
+              <a:defRPr sz="756" b="1"/>
             </a:lvl8pPr>
-            <a:lvl9pPr marL="3023738" indent="0">
+            <a:lvl9pPr marL="1727850" indent="0">
               <a:buNone/>
-              <a:defRPr sz="1323" b="1"/>
+              <a:defRPr sz="756" b="1"/>
             </a:lvl9pPr>
           </a:lstStyle>
           <a:p>
@@ -1403,8 +1403,8 @@
         </p:nvSpPr>
         <p:spPr>
           <a:xfrm>
-            <a:off x="520713" y="2505075"/>
-            <a:ext cx="3198096" cy="3684588"/>
+            <a:off x="297535" y="1577849"/>
+            <a:ext cx="1827388" cy="2320779"/>
           </a:xfrm>
         </p:spPr>
         <p:txBody>
@@ -1460,8 +1460,8 @@
         </p:nvSpPr>
         <p:spPr>
           <a:xfrm>
-            <a:off x="3827086" y="1681163"/>
-            <a:ext cx="3213847" cy="823912"/>
+            <a:off x="2186791" y="1058899"/>
+            <a:ext cx="1836388" cy="518950"/>
           </a:xfrm>
         </p:spPr>
         <p:txBody>
@@ -1469,39 +1469,39 @@
           <a:lstStyle>
             <a:lvl1pPr marL="0" indent="0">
               <a:buNone/>
-              <a:defRPr sz="1984" b="1"/>
+              <a:defRPr sz="1134" b="1"/>
             </a:lvl1pPr>
-            <a:lvl2pPr marL="377967" indent="0">
+            <a:lvl2pPr marL="215981" indent="0">
               <a:buNone/>
-              <a:defRPr sz="1653" b="1"/>
+              <a:defRPr sz="945" b="1"/>
             </a:lvl2pPr>
-            <a:lvl3pPr marL="755934" indent="0">
+            <a:lvl3pPr marL="431963" indent="0">
               <a:buNone/>
-              <a:defRPr sz="1488" b="1"/>
+              <a:defRPr sz="850" b="1"/>
             </a:lvl3pPr>
-            <a:lvl4pPr marL="1133902" indent="0">
+            <a:lvl4pPr marL="647944" indent="0">
               <a:buNone/>
-              <a:defRPr sz="1323" b="1"/>
+              <a:defRPr sz="756" b="1"/>
             </a:lvl4pPr>
-            <a:lvl5pPr marL="1511869" indent="0">
+            <a:lvl5pPr marL="863925" indent="0">
               <a:buNone/>
-              <a:defRPr sz="1323" b="1"/>
+              <a:defRPr sz="756" b="1"/>
             </a:lvl5pPr>
-            <a:lvl6pPr marL="1889836" indent="0">
+            <a:lvl6pPr marL="1079906" indent="0">
               <a:buNone/>
-              <a:defRPr sz="1323" b="1"/>
+              <a:defRPr sz="756" b="1"/>
             </a:lvl6pPr>
-            <a:lvl7pPr marL="2267803" indent="0">
+            <a:lvl7pPr marL="1295888" indent="0">
               <a:buNone/>
-              <a:defRPr sz="1323" b="1"/>
+              <a:defRPr sz="756" b="1"/>
             </a:lvl7pPr>
-            <a:lvl8pPr marL="2645771" indent="0">
+            <a:lvl8pPr marL="1511869" indent="0">
               <a:buNone/>
-              <a:defRPr sz="1323" b="1"/>
+              <a:defRPr sz="756" b="1"/>
             </a:lvl8pPr>
-            <a:lvl9pPr marL="3023738" indent="0">
+            <a:lvl9pPr marL="1727850" indent="0">
               <a:buNone/>
-              <a:defRPr sz="1323" b="1"/>
+              <a:defRPr sz="756" b="1"/>
             </a:lvl9pPr>
           </a:lstStyle>
           <a:p>
@@ -1525,8 +1525,8 @@
         </p:nvSpPr>
         <p:spPr>
           <a:xfrm>
-            <a:off x="3827086" y="2505075"/>
-            <a:ext cx="3213847" cy="3684588"/>
+            <a:off x="2186791" y="1577849"/>
+            <a:ext cx="1836388" cy="2320779"/>
           </a:xfrm>
         </p:spPr>
         <p:txBody>
@@ -1587,7 +1587,7 @@
           <a:p>
             <a:fld id="{BCC74062-80F2-D242-BFAA-677F0420BFA2}" type="datetimeFigureOut">
               <a:rPr lang="en-GB" smtClean="0"/>
-              <a:t>22/12/2017</a:t>
+              <a:t>24/07/2018</a:t>
             </a:fld>
             <a:endParaRPr lang="en-GB"/>
           </a:p>
@@ -1700,7 +1700,7 @@
           <a:p>
             <a:fld id="{BCC74062-80F2-D242-BFAA-677F0420BFA2}" type="datetimeFigureOut">
               <a:rPr lang="en-GB" smtClean="0"/>
-              <a:t>22/12/2017</a:t>
+              <a:t>24/07/2018</a:t>
             </a:fld>
             <a:endParaRPr lang="en-GB"/>
           </a:p>
@@ -1790,7 +1790,7 @@
           <a:p>
             <a:fld id="{BCC74062-80F2-D242-BFAA-677F0420BFA2}" type="datetimeFigureOut">
               <a:rPr lang="en-GB" smtClean="0"/>
-              <a:t>22/12/2017</a:t>
+              <a:t>24/07/2018</a:t>
             </a:fld>
             <a:endParaRPr lang="en-GB"/>
           </a:p>
@@ -1875,15 +1875,15 @@
         </p:nvSpPr>
         <p:spPr>
           <a:xfrm>
-            <a:off x="520712" y="457200"/>
-            <a:ext cx="2438192" cy="1600200"/>
+            <a:off x="297534" y="287972"/>
+            <a:ext cx="1393180" cy="1007904"/>
           </a:xfrm>
         </p:spPr>
         <p:txBody>
           <a:bodyPr anchor="b"/>
           <a:lstStyle>
             <a:lvl1pPr>
-              <a:defRPr sz="2645"/>
+              <a:defRPr sz="1512"/>
             </a:lvl1pPr>
           </a:lstStyle>
           <a:p>
@@ -1907,39 +1907,39 @@
         </p:nvSpPr>
         <p:spPr>
           <a:xfrm>
-            <a:off x="3213847" y="987427"/>
-            <a:ext cx="3827085" cy="4873625"/>
+            <a:off x="1836388" y="621942"/>
+            <a:ext cx="2186791" cy="3069707"/>
           </a:xfrm>
         </p:spPr>
         <p:txBody>
           <a:bodyPr/>
           <a:lstStyle>
             <a:lvl1pPr>
-              <a:defRPr sz="2645"/>
+              <a:defRPr sz="1512"/>
             </a:lvl1pPr>
             <a:lvl2pPr>
-              <a:defRPr sz="2315"/>
+              <a:defRPr sz="1323"/>
             </a:lvl2pPr>
             <a:lvl3pPr>
-              <a:defRPr sz="1984"/>
+              <a:defRPr sz="1134"/>
             </a:lvl3pPr>
             <a:lvl4pPr>
-              <a:defRPr sz="1653"/>
+              <a:defRPr sz="945"/>
             </a:lvl4pPr>
             <a:lvl5pPr>
-              <a:defRPr sz="1653"/>
+              <a:defRPr sz="945"/>
             </a:lvl5pPr>
             <a:lvl6pPr>
-              <a:defRPr sz="1653"/>
+              <a:defRPr sz="945"/>
             </a:lvl6pPr>
             <a:lvl7pPr>
-              <a:defRPr sz="1653"/>
+              <a:defRPr sz="945"/>
             </a:lvl7pPr>
             <a:lvl8pPr>
-              <a:defRPr sz="1653"/>
+              <a:defRPr sz="945"/>
             </a:lvl8pPr>
             <a:lvl9pPr>
-              <a:defRPr sz="1653"/>
+              <a:defRPr sz="945"/>
             </a:lvl9pPr>
           </a:lstStyle>
           <a:p>
@@ -1992,8 +1992,8 @@
         </p:nvSpPr>
         <p:spPr>
           <a:xfrm>
-            <a:off x="520712" y="2057400"/>
-            <a:ext cx="2438192" cy="3811588"/>
+            <a:off x="297534" y="1295877"/>
+            <a:ext cx="1393180" cy="2400771"/>
           </a:xfrm>
         </p:spPr>
         <p:txBody>
@@ -2001,39 +2001,39 @@
           <a:lstStyle>
             <a:lvl1pPr marL="0" indent="0">
               <a:buNone/>
-              <a:defRPr sz="1323"/>
+              <a:defRPr sz="756"/>
             </a:lvl1pPr>
-            <a:lvl2pPr marL="377967" indent="0">
+            <a:lvl2pPr marL="215981" indent="0">
               <a:buNone/>
-              <a:defRPr sz="1157"/>
+              <a:defRPr sz="661"/>
             </a:lvl2pPr>
-            <a:lvl3pPr marL="755934" indent="0">
+            <a:lvl3pPr marL="431963" indent="0">
               <a:buNone/>
-              <a:defRPr sz="992"/>
+              <a:defRPr sz="567"/>
             </a:lvl3pPr>
-            <a:lvl4pPr marL="1133902" indent="0">
+            <a:lvl4pPr marL="647944" indent="0">
               <a:buNone/>
-              <a:defRPr sz="827"/>
+              <a:defRPr sz="472"/>
             </a:lvl4pPr>
-            <a:lvl5pPr marL="1511869" indent="0">
+            <a:lvl5pPr marL="863925" indent="0">
               <a:buNone/>
-              <a:defRPr sz="827"/>
+              <a:defRPr sz="472"/>
             </a:lvl5pPr>
-            <a:lvl6pPr marL="1889836" indent="0">
+            <a:lvl6pPr marL="1079906" indent="0">
               <a:buNone/>
-              <a:defRPr sz="827"/>
+              <a:defRPr sz="472"/>
             </a:lvl6pPr>
-            <a:lvl7pPr marL="2267803" indent="0">
+            <a:lvl7pPr marL="1295888" indent="0">
               <a:buNone/>
-              <a:defRPr sz="827"/>
+              <a:defRPr sz="472"/>
             </a:lvl7pPr>
-            <a:lvl8pPr marL="2645771" indent="0">
+            <a:lvl8pPr marL="1511869" indent="0">
               <a:buNone/>
-              <a:defRPr sz="827"/>
+              <a:defRPr sz="472"/>
             </a:lvl8pPr>
-            <a:lvl9pPr marL="3023738" indent="0">
+            <a:lvl9pPr marL="1727850" indent="0">
               <a:buNone/>
-              <a:defRPr sz="827"/>
+              <a:defRPr sz="472"/>
             </a:lvl9pPr>
           </a:lstStyle>
           <a:p>
@@ -2062,7 +2062,7 @@
           <a:p>
             <a:fld id="{BCC74062-80F2-D242-BFAA-677F0420BFA2}" type="datetimeFigureOut">
               <a:rPr lang="en-GB" smtClean="0"/>
-              <a:t>22/12/2017</a:t>
+              <a:t>24/07/2018</a:t>
             </a:fld>
             <a:endParaRPr lang="en-GB"/>
           </a:p>
@@ -2147,15 +2147,15 @@
         </p:nvSpPr>
         <p:spPr>
           <a:xfrm>
-            <a:off x="520712" y="457200"/>
-            <a:ext cx="2438192" cy="1600200"/>
+            <a:off x="297534" y="287972"/>
+            <a:ext cx="1393180" cy="1007904"/>
           </a:xfrm>
         </p:spPr>
         <p:txBody>
           <a:bodyPr anchor="b"/>
           <a:lstStyle>
             <a:lvl1pPr>
-              <a:defRPr sz="2645"/>
+              <a:defRPr sz="1512"/>
             </a:lvl1pPr>
           </a:lstStyle>
           <a:p>
@@ -2179,8 +2179,8 @@
         </p:nvSpPr>
         <p:spPr>
           <a:xfrm>
-            <a:off x="3213847" y="987427"/>
-            <a:ext cx="3827085" cy="4873625"/>
+            <a:off x="1836388" y="621942"/>
+            <a:ext cx="2186791" cy="3069707"/>
           </a:xfrm>
         </p:spPr>
         <p:txBody>
@@ -2188,39 +2188,39 @@
           <a:lstStyle>
             <a:lvl1pPr marL="0" indent="0">
               <a:buNone/>
-              <a:defRPr sz="2645"/>
+              <a:defRPr sz="1512"/>
             </a:lvl1pPr>
-            <a:lvl2pPr marL="377967" indent="0">
+            <a:lvl2pPr marL="215981" indent="0">
               <a:buNone/>
-              <a:defRPr sz="2315"/>
+              <a:defRPr sz="1323"/>
             </a:lvl2pPr>
-            <a:lvl3pPr marL="755934" indent="0">
+            <a:lvl3pPr marL="431963" indent="0">
               <a:buNone/>
-              <a:defRPr sz="1984"/>
+              <a:defRPr sz="1134"/>
             </a:lvl3pPr>
-            <a:lvl4pPr marL="1133902" indent="0">
+            <a:lvl4pPr marL="647944" indent="0">
               <a:buNone/>
-              <a:defRPr sz="1653"/>
+              <a:defRPr sz="945"/>
             </a:lvl4pPr>
-            <a:lvl5pPr marL="1511869" indent="0">
+            <a:lvl5pPr marL="863925" indent="0">
               <a:buNone/>
-              <a:defRPr sz="1653"/>
+              <a:defRPr sz="945"/>
             </a:lvl5pPr>
-            <a:lvl6pPr marL="1889836" indent="0">
+            <a:lvl6pPr marL="1079906" indent="0">
               <a:buNone/>
-              <a:defRPr sz="1653"/>
+              <a:defRPr sz="945"/>
             </a:lvl6pPr>
-            <a:lvl7pPr marL="2267803" indent="0">
+            <a:lvl7pPr marL="1295888" indent="0">
               <a:buNone/>
-              <a:defRPr sz="1653"/>
+              <a:defRPr sz="945"/>
             </a:lvl7pPr>
-            <a:lvl8pPr marL="2645771" indent="0">
+            <a:lvl8pPr marL="1511869" indent="0">
               <a:buNone/>
-              <a:defRPr sz="1653"/>
+              <a:defRPr sz="945"/>
             </a:lvl8pPr>
-            <a:lvl9pPr marL="3023738" indent="0">
+            <a:lvl9pPr marL="1727850" indent="0">
               <a:buNone/>
-              <a:defRPr sz="1653"/>
+              <a:defRPr sz="945"/>
             </a:lvl9pPr>
           </a:lstStyle>
           <a:p>
@@ -2244,8 +2244,8 @@
         </p:nvSpPr>
         <p:spPr>
           <a:xfrm>
-            <a:off x="520712" y="2057400"/>
-            <a:ext cx="2438192" cy="3811588"/>
+            <a:off x="297534" y="1295877"/>
+            <a:ext cx="1393180" cy="2400771"/>
           </a:xfrm>
         </p:spPr>
         <p:txBody>
@@ -2253,39 +2253,39 @@
           <a:lstStyle>
             <a:lvl1pPr marL="0" indent="0">
               <a:buNone/>
-              <a:defRPr sz="1323"/>
+              <a:defRPr sz="756"/>
             </a:lvl1pPr>
-            <a:lvl2pPr marL="377967" indent="0">
+            <a:lvl2pPr marL="215981" indent="0">
               <a:buNone/>
-              <a:defRPr sz="1157"/>
+              <a:defRPr sz="661"/>
             </a:lvl2pPr>
-            <a:lvl3pPr marL="755934" indent="0">
+            <a:lvl3pPr marL="431963" indent="0">
               <a:buNone/>
-              <a:defRPr sz="992"/>
+              <a:defRPr sz="567"/>
             </a:lvl3pPr>
-            <a:lvl4pPr marL="1133902" indent="0">
+            <a:lvl4pPr marL="647944" indent="0">
               <a:buNone/>
-              <a:defRPr sz="827"/>
+              <a:defRPr sz="472"/>
             </a:lvl4pPr>
-            <a:lvl5pPr marL="1511869" indent="0">
+            <a:lvl5pPr marL="863925" indent="0">
               <a:buNone/>
-              <a:defRPr sz="827"/>
+              <a:defRPr sz="472"/>
             </a:lvl5pPr>
-            <a:lvl6pPr marL="1889836" indent="0">
+            <a:lvl6pPr marL="1079906" indent="0">
               <a:buNone/>
-              <a:defRPr sz="827"/>
+              <a:defRPr sz="472"/>
             </a:lvl6pPr>
-            <a:lvl7pPr marL="2267803" indent="0">
+            <a:lvl7pPr marL="1295888" indent="0">
               <a:buNone/>
-              <a:defRPr sz="827"/>
+              <a:defRPr sz="472"/>
             </a:lvl7pPr>
-            <a:lvl8pPr marL="2645771" indent="0">
+            <a:lvl8pPr marL="1511869" indent="0">
               <a:buNone/>
-              <a:defRPr sz="827"/>
+              <a:defRPr sz="472"/>
             </a:lvl8pPr>
-            <a:lvl9pPr marL="3023738" indent="0">
+            <a:lvl9pPr marL="1727850" indent="0">
               <a:buNone/>
-              <a:defRPr sz="827"/>
+              <a:defRPr sz="472"/>
             </a:lvl9pPr>
           </a:lstStyle>
           <a:p>
@@ -2314,7 +2314,7 @@
           <a:p>
             <a:fld id="{BCC74062-80F2-D242-BFAA-677F0420BFA2}" type="datetimeFigureOut">
               <a:rPr lang="en-GB" smtClean="0"/>
-              <a:t>22/12/2017</a:t>
+              <a:t>24/07/2018</a:t>
             </a:fld>
             <a:endParaRPr lang="en-GB"/>
           </a:p>
@@ -2404,8 +2404,8 @@
         </p:nvSpPr>
         <p:spPr>
           <a:xfrm>
-            <a:off x="519728" y="365127"/>
-            <a:ext cx="6520220" cy="1325563"/>
+            <a:off x="296972" y="229979"/>
+            <a:ext cx="3725645" cy="834921"/>
           </a:xfrm>
           <a:prstGeom prst="rect">
             <a:avLst/>
@@ -2437,8 +2437,8 @@
         </p:nvSpPr>
         <p:spPr>
           <a:xfrm>
-            <a:off x="519728" y="1825625"/>
-            <a:ext cx="6520220" cy="4351338"/>
+            <a:off x="296972" y="1149890"/>
+            <a:ext cx="3725645" cy="2740739"/>
           </a:xfrm>
           <a:prstGeom prst="rect">
             <a:avLst/>
@@ -2499,8 +2499,8 @@
         </p:nvSpPr>
         <p:spPr>
           <a:xfrm>
-            <a:off x="519728" y="6356352"/>
-            <a:ext cx="1700927" cy="365125"/>
+            <a:off x="296972" y="4003619"/>
+            <a:ext cx="971907" cy="229978"/>
           </a:xfrm>
           <a:prstGeom prst="rect">
             <a:avLst/>
@@ -2510,7 +2510,7 @@
           <a:bodyPr vert="horz" lIns="91440" tIns="45720" rIns="91440" bIns="45720" rtlCol="0" anchor="ctr"/>
           <a:lstStyle>
             <a:lvl1pPr algn="l">
-              <a:defRPr sz="992">
+              <a:defRPr sz="567">
                 <a:solidFill>
                   <a:schemeClr val="tx1">
                     <a:tint val="75000"/>
@@ -2522,7 +2522,7 @@
           <a:p>
             <a:fld id="{BCC74062-80F2-D242-BFAA-677F0420BFA2}" type="datetimeFigureOut">
               <a:rPr lang="en-GB" smtClean="0"/>
-              <a:t>22/12/2017</a:t>
+              <a:t>24/07/2018</a:t>
             </a:fld>
             <a:endParaRPr lang="en-GB"/>
           </a:p>
@@ -2540,8 +2540,8 @@
         </p:nvSpPr>
         <p:spPr>
           <a:xfrm>
-            <a:off x="2504143" y="6356352"/>
-            <a:ext cx="2551390" cy="365125"/>
+            <a:off x="1430864" y="4003619"/>
+            <a:ext cx="1457861" cy="229978"/>
           </a:xfrm>
           <a:prstGeom prst="rect">
             <a:avLst/>
@@ -2551,7 +2551,7 @@
           <a:bodyPr vert="horz" lIns="91440" tIns="45720" rIns="91440" bIns="45720" rtlCol="0" anchor="ctr"/>
           <a:lstStyle>
             <a:lvl1pPr algn="ctr">
-              <a:defRPr sz="992">
+              <a:defRPr sz="567">
                 <a:solidFill>
                   <a:schemeClr val="tx1">
                     <a:tint val="75000"/>
@@ -2577,8 +2577,8 @@
         </p:nvSpPr>
         <p:spPr>
           <a:xfrm>
-            <a:off x="5339020" y="6356352"/>
-            <a:ext cx="1700927" cy="365125"/>
+            <a:off x="3050709" y="4003619"/>
+            <a:ext cx="971907" cy="229978"/>
           </a:xfrm>
           <a:prstGeom prst="rect">
             <a:avLst/>
@@ -2588,7 +2588,7 @@
           <a:bodyPr vert="horz" lIns="91440" tIns="45720" rIns="91440" bIns="45720" rtlCol="0" anchor="ctr"/>
           <a:lstStyle>
             <a:lvl1pPr algn="r">
-              <a:defRPr sz="992">
+              <a:defRPr sz="567">
                 <a:solidFill>
                   <a:schemeClr val="tx1">
                     <a:tint val="75000"/>
@@ -2609,27 +2609,27 @@
     </p:spTree>
     <p:extLst>
       <p:ext uri="{BB962C8B-B14F-4D97-AF65-F5344CB8AC3E}">
-        <p14:creationId xmlns:p14="http://schemas.microsoft.com/office/powerpoint/2010/main" val="1387152135"/>
+        <p14:creationId xmlns:p14="http://schemas.microsoft.com/office/powerpoint/2010/main" val="945965280"/>
       </p:ext>
     </p:extLst>
   </p:cSld>
   <p:clrMap bg1="lt1" tx1="dk1" bg2="lt2" tx2="dk2" accent1="accent1" accent2="accent2" accent3="accent3" accent4="accent4" accent5="accent5" accent6="accent6" hlink="hlink" folHlink="folHlink"/>
   <p:sldLayoutIdLst>
-    <p:sldLayoutId id="2147483685" r:id="rId1"/>
-    <p:sldLayoutId id="2147483686" r:id="rId2"/>
-    <p:sldLayoutId id="2147483687" r:id="rId3"/>
-    <p:sldLayoutId id="2147483688" r:id="rId4"/>
-    <p:sldLayoutId id="2147483689" r:id="rId5"/>
-    <p:sldLayoutId id="2147483690" r:id="rId6"/>
-    <p:sldLayoutId id="2147483691" r:id="rId7"/>
-    <p:sldLayoutId id="2147483692" r:id="rId8"/>
-    <p:sldLayoutId id="2147483693" r:id="rId9"/>
-    <p:sldLayoutId id="2147483694" r:id="rId10"/>
-    <p:sldLayoutId id="2147483695" r:id="rId11"/>
+    <p:sldLayoutId id="2147483697" r:id="rId1"/>
+    <p:sldLayoutId id="2147483698" r:id="rId2"/>
+    <p:sldLayoutId id="2147483699" r:id="rId3"/>
+    <p:sldLayoutId id="2147483700" r:id="rId4"/>
+    <p:sldLayoutId id="2147483701" r:id="rId5"/>
+    <p:sldLayoutId id="2147483702" r:id="rId6"/>
+    <p:sldLayoutId id="2147483703" r:id="rId7"/>
+    <p:sldLayoutId id="2147483704" r:id="rId8"/>
+    <p:sldLayoutId id="2147483705" r:id="rId9"/>
+    <p:sldLayoutId id="2147483706" r:id="rId10"/>
+    <p:sldLayoutId id="2147483707" r:id="rId11"/>
   </p:sldLayoutIdLst>
   <p:txStyles>
     <p:titleStyle>
-      <a:lvl1pPr algn="l" defTabSz="755934" rtl="0" eaLnBrk="1" latinLnBrk="0" hangingPunct="1">
+      <a:lvl1pPr algn="l" defTabSz="431963" rtl="0" eaLnBrk="1" latinLnBrk="0" hangingPunct="1">
         <a:lnSpc>
           <a:spcPct val="90000"/>
         </a:lnSpc>
@@ -2637,7 +2637,7 @@
           <a:spcPct val="0"/>
         </a:spcBef>
         <a:buNone/>
-        <a:defRPr sz="3637" kern="1200">
+        <a:defRPr sz="2079" kern="1200">
           <a:solidFill>
             <a:schemeClr val="tx1"/>
           </a:solidFill>
@@ -2648,16 +2648,16 @@
       </a:lvl1pPr>
     </p:titleStyle>
     <p:bodyStyle>
-      <a:lvl1pPr marL="188984" indent="-188984" algn="l" defTabSz="755934" rtl="0" eaLnBrk="1" latinLnBrk="0" hangingPunct="1">
+      <a:lvl1pPr marL="107991" indent="-107991" algn="l" defTabSz="431963" rtl="0" eaLnBrk="1" latinLnBrk="0" hangingPunct="1">
         <a:lnSpc>
           <a:spcPct val="90000"/>
         </a:lnSpc>
         <a:spcBef>
-          <a:spcPts val="827"/>
+          <a:spcPts val="472"/>
         </a:spcBef>
         <a:buFont typeface="Arial" panose="020B0604020202020204" pitchFamily="34" charset="0"/>
         <a:buChar char="•"/>
-        <a:defRPr sz="2315" kern="1200">
+        <a:defRPr sz="1323" kern="1200">
           <a:solidFill>
             <a:schemeClr val="tx1"/>
           </a:solidFill>
@@ -2666,16 +2666,16 @@
           <a:cs typeface="+mn-cs"/>
         </a:defRPr>
       </a:lvl1pPr>
-      <a:lvl2pPr marL="566951" indent="-188984" algn="l" defTabSz="755934" rtl="0" eaLnBrk="1" latinLnBrk="0" hangingPunct="1">
+      <a:lvl2pPr marL="323972" indent="-107991" algn="l" defTabSz="431963" rtl="0" eaLnBrk="1" latinLnBrk="0" hangingPunct="1">
         <a:lnSpc>
           <a:spcPct val="90000"/>
         </a:lnSpc>
         <a:spcBef>
-          <a:spcPts val="413"/>
+          <a:spcPts val="236"/>
         </a:spcBef>
         <a:buFont typeface="Arial" panose="020B0604020202020204" pitchFamily="34" charset="0"/>
         <a:buChar char="•"/>
-        <a:defRPr sz="1984" kern="1200">
+        <a:defRPr sz="1134" kern="1200">
           <a:solidFill>
             <a:schemeClr val="tx1"/>
           </a:solidFill>
@@ -2684,16 +2684,16 @@
           <a:cs typeface="+mn-cs"/>
         </a:defRPr>
       </a:lvl2pPr>
-      <a:lvl3pPr marL="944918" indent="-188984" algn="l" defTabSz="755934" rtl="0" eaLnBrk="1" latinLnBrk="0" hangingPunct="1">
+      <a:lvl3pPr marL="539953" indent="-107991" algn="l" defTabSz="431963" rtl="0" eaLnBrk="1" latinLnBrk="0" hangingPunct="1">
         <a:lnSpc>
           <a:spcPct val="90000"/>
         </a:lnSpc>
         <a:spcBef>
-          <a:spcPts val="413"/>
+          <a:spcPts val="236"/>
         </a:spcBef>
         <a:buFont typeface="Arial" panose="020B0604020202020204" pitchFamily="34" charset="0"/>
         <a:buChar char="•"/>
-        <a:defRPr sz="1653" kern="1200">
+        <a:defRPr sz="945" kern="1200">
           <a:solidFill>
             <a:schemeClr val="tx1"/>
           </a:solidFill>
@@ -2702,16 +2702,16 @@
           <a:cs typeface="+mn-cs"/>
         </a:defRPr>
       </a:lvl3pPr>
-      <a:lvl4pPr marL="1322885" indent="-188984" algn="l" defTabSz="755934" rtl="0" eaLnBrk="1" latinLnBrk="0" hangingPunct="1">
+      <a:lvl4pPr marL="755934" indent="-107991" algn="l" defTabSz="431963" rtl="0" eaLnBrk="1" latinLnBrk="0" hangingPunct="1">
         <a:lnSpc>
           <a:spcPct val="90000"/>
         </a:lnSpc>
         <a:spcBef>
-          <a:spcPts val="413"/>
+          <a:spcPts val="236"/>
         </a:spcBef>
         <a:buFont typeface="Arial" panose="020B0604020202020204" pitchFamily="34" charset="0"/>
         <a:buChar char="•"/>
-        <a:defRPr sz="1488" kern="1200">
+        <a:defRPr sz="850" kern="1200">
           <a:solidFill>
             <a:schemeClr val="tx1"/>
           </a:solidFill>
@@ -2720,16 +2720,16 @@
           <a:cs typeface="+mn-cs"/>
         </a:defRPr>
       </a:lvl4pPr>
-      <a:lvl5pPr marL="1700853" indent="-188984" algn="l" defTabSz="755934" rtl="0" eaLnBrk="1" latinLnBrk="0" hangingPunct="1">
+      <a:lvl5pPr marL="971916" indent="-107991" algn="l" defTabSz="431963" rtl="0" eaLnBrk="1" latinLnBrk="0" hangingPunct="1">
         <a:lnSpc>
           <a:spcPct val="90000"/>
         </a:lnSpc>
         <a:spcBef>
-          <a:spcPts val="413"/>
+          <a:spcPts val="236"/>
         </a:spcBef>
         <a:buFont typeface="Arial" panose="020B0604020202020204" pitchFamily="34" charset="0"/>
         <a:buChar char="•"/>
-        <a:defRPr sz="1488" kern="1200">
+        <a:defRPr sz="850" kern="1200">
           <a:solidFill>
             <a:schemeClr val="tx1"/>
           </a:solidFill>
@@ -2738,16 +2738,16 @@
           <a:cs typeface="+mn-cs"/>
         </a:defRPr>
       </a:lvl5pPr>
-      <a:lvl6pPr marL="2078820" indent="-188984" algn="l" defTabSz="755934" rtl="0" eaLnBrk="1" latinLnBrk="0" hangingPunct="1">
+      <a:lvl6pPr marL="1187897" indent="-107991" algn="l" defTabSz="431963" rtl="0" eaLnBrk="1" latinLnBrk="0" hangingPunct="1">
         <a:lnSpc>
           <a:spcPct val="90000"/>
         </a:lnSpc>
         <a:spcBef>
-          <a:spcPts val="413"/>
+          <a:spcPts val="236"/>
         </a:spcBef>
         <a:buFont typeface="Arial" panose="020B0604020202020204" pitchFamily="34" charset="0"/>
         <a:buChar char="•"/>
-        <a:defRPr sz="1488" kern="1200">
+        <a:defRPr sz="850" kern="1200">
           <a:solidFill>
             <a:schemeClr val="tx1"/>
           </a:solidFill>
@@ -2756,16 +2756,16 @@
           <a:cs typeface="+mn-cs"/>
         </a:defRPr>
       </a:lvl6pPr>
-      <a:lvl7pPr marL="2456787" indent="-188984" algn="l" defTabSz="755934" rtl="0" eaLnBrk="1" latinLnBrk="0" hangingPunct="1">
+      <a:lvl7pPr marL="1403878" indent="-107991" algn="l" defTabSz="431963" rtl="0" eaLnBrk="1" latinLnBrk="0" hangingPunct="1">
         <a:lnSpc>
           <a:spcPct val="90000"/>
         </a:lnSpc>
         <a:spcBef>
-          <a:spcPts val="413"/>
+          <a:spcPts val="236"/>
         </a:spcBef>
         <a:buFont typeface="Arial" panose="020B0604020202020204" pitchFamily="34" charset="0"/>
         <a:buChar char="•"/>
-        <a:defRPr sz="1488" kern="1200">
+        <a:defRPr sz="850" kern="1200">
           <a:solidFill>
             <a:schemeClr val="tx1"/>
           </a:solidFill>
@@ -2774,16 +2774,16 @@
           <a:cs typeface="+mn-cs"/>
         </a:defRPr>
       </a:lvl7pPr>
-      <a:lvl8pPr marL="2834754" indent="-188984" algn="l" defTabSz="755934" rtl="0" eaLnBrk="1" latinLnBrk="0" hangingPunct="1">
+      <a:lvl8pPr marL="1619860" indent="-107991" algn="l" defTabSz="431963" rtl="0" eaLnBrk="1" latinLnBrk="0" hangingPunct="1">
         <a:lnSpc>
           <a:spcPct val="90000"/>
         </a:lnSpc>
         <a:spcBef>
-          <a:spcPts val="413"/>
+          <a:spcPts val="236"/>
         </a:spcBef>
         <a:buFont typeface="Arial" panose="020B0604020202020204" pitchFamily="34" charset="0"/>
         <a:buChar char="•"/>
-        <a:defRPr sz="1488" kern="1200">
+        <a:defRPr sz="850" kern="1200">
           <a:solidFill>
             <a:schemeClr val="tx1"/>
           </a:solidFill>
@@ -2792,16 +2792,16 @@
           <a:cs typeface="+mn-cs"/>
         </a:defRPr>
       </a:lvl8pPr>
-      <a:lvl9pPr marL="3212722" indent="-188984" algn="l" defTabSz="755934" rtl="0" eaLnBrk="1" latinLnBrk="0" hangingPunct="1">
+      <a:lvl9pPr marL="1835841" indent="-107991" algn="l" defTabSz="431963" rtl="0" eaLnBrk="1" latinLnBrk="0" hangingPunct="1">
         <a:lnSpc>
           <a:spcPct val="90000"/>
         </a:lnSpc>
         <a:spcBef>
-          <a:spcPts val="413"/>
+          <a:spcPts val="236"/>
         </a:spcBef>
         <a:buFont typeface="Arial" panose="020B0604020202020204" pitchFamily="34" charset="0"/>
         <a:buChar char="•"/>
-        <a:defRPr sz="1488" kern="1200">
+        <a:defRPr sz="850" kern="1200">
           <a:solidFill>
             <a:schemeClr val="tx1"/>
           </a:solidFill>
@@ -2815,8 +2815,8 @@
       <a:defPPr>
         <a:defRPr lang="en-US"/>
       </a:defPPr>
-      <a:lvl1pPr marL="0" algn="l" defTabSz="755934" rtl="0" eaLnBrk="1" latinLnBrk="0" hangingPunct="1">
-        <a:defRPr sz="1488" kern="1200">
+      <a:lvl1pPr marL="0" algn="l" defTabSz="431963" rtl="0" eaLnBrk="1" latinLnBrk="0" hangingPunct="1">
+        <a:defRPr sz="850" kern="1200">
           <a:solidFill>
             <a:schemeClr val="tx1"/>
           </a:solidFill>
@@ -2825,8 +2825,8 @@
           <a:cs typeface="+mn-cs"/>
         </a:defRPr>
       </a:lvl1pPr>
-      <a:lvl2pPr marL="377967" algn="l" defTabSz="755934" rtl="0" eaLnBrk="1" latinLnBrk="0" hangingPunct="1">
-        <a:defRPr sz="1488" kern="1200">
+      <a:lvl2pPr marL="215981" algn="l" defTabSz="431963" rtl="0" eaLnBrk="1" latinLnBrk="0" hangingPunct="1">
+        <a:defRPr sz="850" kern="1200">
           <a:solidFill>
             <a:schemeClr val="tx1"/>
           </a:solidFill>
@@ -2835,8 +2835,8 @@
           <a:cs typeface="+mn-cs"/>
         </a:defRPr>
       </a:lvl2pPr>
-      <a:lvl3pPr marL="755934" algn="l" defTabSz="755934" rtl="0" eaLnBrk="1" latinLnBrk="0" hangingPunct="1">
-        <a:defRPr sz="1488" kern="1200">
+      <a:lvl3pPr marL="431963" algn="l" defTabSz="431963" rtl="0" eaLnBrk="1" latinLnBrk="0" hangingPunct="1">
+        <a:defRPr sz="850" kern="1200">
           <a:solidFill>
             <a:schemeClr val="tx1"/>
           </a:solidFill>
@@ -2845,8 +2845,8 @@
           <a:cs typeface="+mn-cs"/>
         </a:defRPr>
       </a:lvl3pPr>
-      <a:lvl4pPr marL="1133902" algn="l" defTabSz="755934" rtl="0" eaLnBrk="1" latinLnBrk="0" hangingPunct="1">
-        <a:defRPr sz="1488" kern="1200">
+      <a:lvl4pPr marL="647944" algn="l" defTabSz="431963" rtl="0" eaLnBrk="1" latinLnBrk="0" hangingPunct="1">
+        <a:defRPr sz="850" kern="1200">
           <a:solidFill>
             <a:schemeClr val="tx1"/>
           </a:solidFill>
@@ -2855,8 +2855,8 @@
           <a:cs typeface="+mn-cs"/>
         </a:defRPr>
       </a:lvl4pPr>
-      <a:lvl5pPr marL="1511869" algn="l" defTabSz="755934" rtl="0" eaLnBrk="1" latinLnBrk="0" hangingPunct="1">
-        <a:defRPr sz="1488" kern="1200">
+      <a:lvl5pPr marL="863925" algn="l" defTabSz="431963" rtl="0" eaLnBrk="1" latinLnBrk="0" hangingPunct="1">
+        <a:defRPr sz="850" kern="1200">
           <a:solidFill>
             <a:schemeClr val="tx1"/>
           </a:solidFill>
@@ -2865,8 +2865,8 @@
           <a:cs typeface="+mn-cs"/>
         </a:defRPr>
       </a:lvl5pPr>
-      <a:lvl6pPr marL="1889836" algn="l" defTabSz="755934" rtl="0" eaLnBrk="1" latinLnBrk="0" hangingPunct="1">
-        <a:defRPr sz="1488" kern="1200">
+      <a:lvl6pPr marL="1079906" algn="l" defTabSz="431963" rtl="0" eaLnBrk="1" latinLnBrk="0" hangingPunct="1">
+        <a:defRPr sz="850" kern="1200">
           <a:solidFill>
             <a:schemeClr val="tx1"/>
           </a:solidFill>
@@ -2875,8 +2875,8 @@
           <a:cs typeface="+mn-cs"/>
         </a:defRPr>
       </a:lvl6pPr>
-      <a:lvl7pPr marL="2267803" algn="l" defTabSz="755934" rtl="0" eaLnBrk="1" latinLnBrk="0" hangingPunct="1">
-        <a:defRPr sz="1488" kern="1200">
+      <a:lvl7pPr marL="1295888" algn="l" defTabSz="431963" rtl="0" eaLnBrk="1" latinLnBrk="0" hangingPunct="1">
+        <a:defRPr sz="850" kern="1200">
           <a:solidFill>
             <a:schemeClr val="tx1"/>
           </a:solidFill>
@@ -2885,8 +2885,8 @@
           <a:cs typeface="+mn-cs"/>
         </a:defRPr>
       </a:lvl7pPr>
-      <a:lvl8pPr marL="2645771" algn="l" defTabSz="755934" rtl="0" eaLnBrk="1" latinLnBrk="0" hangingPunct="1">
-        <a:defRPr sz="1488" kern="1200">
+      <a:lvl8pPr marL="1511869" algn="l" defTabSz="431963" rtl="0" eaLnBrk="1" latinLnBrk="0" hangingPunct="1">
+        <a:defRPr sz="850" kern="1200">
           <a:solidFill>
             <a:schemeClr val="tx1"/>
           </a:solidFill>
@@ -2895,8 +2895,8 @@
           <a:cs typeface="+mn-cs"/>
         </a:defRPr>
       </a:lvl8pPr>
-      <a:lvl9pPr marL="3023738" algn="l" defTabSz="755934" rtl="0" eaLnBrk="1" latinLnBrk="0" hangingPunct="1">
-        <a:defRPr sz="1488" kern="1200">
+      <a:lvl9pPr marL="1727850" algn="l" defTabSz="431963" rtl="0" eaLnBrk="1" latinLnBrk="0" hangingPunct="1">
+        <a:defRPr sz="850" kern="1200">
           <a:solidFill>
             <a:schemeClr val="tx1"/>
           </a:solidFill>
@@ -2935,7 +2935,7 @@
         </p:nvGrpSpPr>
         <p:grpSpPr>
           <a:xfrm>
-            <a:off x="539844" y="4003318"/>
+            <a:off x="723503" y="2282759"/>
             <a:ext cx="3298849" cy="1974482"/>
             <a:chOff x="283286" y="3801840"/>
             <a:chExt cx="3298849" cy="1974482"/>
@@ -4645,1729 +4645,13 @@
       </p:grpSp>
       <p:grpSp>
         <p:nvGrpSpPr>
-          <p:cNvPr id="11" name="Group 10"/>
-          <p:cNvGrpSpPr/>
-          <p:nvPr/>
-        </p:nvGrpSpPr>
-        <p:grpSpPr>
-          <a:xfrm>
-            <a:off x="3844069" y="3295557"/>
-            <a:ext cx="2964899" cy="3254002"/>
-            <a:chOff x="3587510" y="3094079"/>
-            <a:chExt cx="2964899" cy="3254002"/>
-          </a:xfrm>
-        </p:grpSpPr>
-        <p:sp>
-          <p:nvSpPr>
-            <p:cNvPr id="239" name="Rectangle 238"/>
-            <p:cNvSpPr/>
-            <p:nvPr/>
-          </p:nvSpPr>
-          <p:spPr>
-            <a:xfrm rot="5400000">
-              <a:off x="4699777" y="4104630"/>
-              <a:ext cx="330214" cy="239843"/>
-            </a:xfrm>
-            <a:prstGeom prst="rect">
-              <a:avLst/>
-            </a:prstGeom>
-            <a:solidFill>
-              <a:schemeClr val="bg1">
-                <a:lumMod val="85000"/>
-              </a:schemeClr>
-            </a:solidFill>
-            <a:ln>
-              <a:noFill/>
-            </a:ln>
-          </p:spPr>
-          <p:style>
-            <a:lnRef idx="2">
-              <a:schemeClr val="accent1">
-                <a:shade val="50000"/>
-              </a:schemeClr>
-            </a:lnRef>
-            <a:fillRef idx="1">
-              <a:schemeClr val="accent1"/>
-            </a:fillRef>
-            <a:effectRef idx="0">
-              <a:schemeClr val="accent1"/>
-            </a:effectRef>
-            <a:fontRef idx="minor">
-              <a:schemeClr val="lt1"/>
-            </a:fontRef>
-          </p:style>
-          <p:txBody>
-            <a:bodyPr rtlCol="0" anchor="ctr"/>
-            <a:lstStyle/>
-            <a:p>
-              <a:pPr algn="ctr"/>
-              <a:endParaRPr lang="en-GB"/>
-            </a:p>
-          </p:txBody>
-        </p:sp>
-        <p:cxnSp>
-          <p:nvCxnSpPr>
-            <p:cNvPr id="240" name="Straight Connector 239"/>
-            <p:cNvCxnSpPr/>
-            <p:nvPr/>
-          </p:nvCxnSpPr>
-          <p:spPr>
-            <a:xfrm rot="5400000">
-              <a:off x="4259374" y="4773671"/>
-              <a:ext cx="2630627" cy="0"/>
-            </a:xfrm>
-            <a:prstGeom prst="line">
-              <a:avLst/>
-            </a:prstGeom>
-          </p:spPr>
-          <p:style>
-            <a:lnRef idx="1">
-              <a:schemeClr val="accent1"/>
-            </a:lnRef>
-            <a:fillRef idx="0">
-              <a:schemeClr val="accent1"/>
-            </a:fillRef>
-            <a:effectRef idx="0">
-              <a:schemeClr val="accent1"/>
-            </a:effectRef>
-            <a:fontRef idx="minor">
-              <a:schemeClr val="tx1"/>
-            </a:fontRef>
-          </p:style>
-        </p:cxnSp>
-        <p:cxnSp>
-          <p:nvCxnSpPr>
-            <p:cNvPr id="241" name="Straight Connector 240"/>
-            <p:cNvCxnSpPr/>
-            <p:nvPr/>
-          </p:nvCxnSpPr>
-          <p:spPr>
-            <a:xfrm rot="5400000">
-              <a:off x="5057603" y="2941273"/>
-              <a:ext cx="0" cy="1034169"/>
-            </a:xfrm>
-            <a:prstGeom prst="line">
-              <a:avLst/>
-            </a:prstGeom>
-          </p:spPr>
-          <p:style>
-            <a:lnRef idx="1">
-              <a:schemeClr val="accent1"/>
-            </a:lnRef>
-            <a:fillRef idx="0">
-              <a:schemeClr val="accent1"/>
-            </a:fillRef>
-            <a:effectRef idx="0">
-              <a:schemeClr val="accent1"/>
-            </a:effectRef>
-            <a:fontRef idx="minor">
-              <a:schemeClr val="tx1"/>
-            </a:fontRef>
-          </p:style>
-        </p:cxnSp>
-        <p:cxnSp>
-          <p:nvCxnSpPr>
-            <p:cNvPr id="242" name="Straight Connector 241"/>
-            <p:cNvCxnSpPr/>
-            <p:nvPr/>
-          </p:nvCxnSpPr>
-          <p:spPr>
-            <a:xfrm>
-              <a:off x="4540518" y="3094079"/>
-              <a:ext cx="0" cy="3254002"/>
-            </a:xfrm>
-            <a:prstGeom prst="line">
-              <a:avLst/>
-            </a:prstGeom>
-            <a:ln>
-              <a:solidFill>
-                <a:schemeClr val="tx1"/>
-              </a:solidFill>
-            </a:ln>
-          </p:spPr>
-          <p:style>
-            <a:lnRef idx="1">
-              <a:schemeClr val="accent1"/>
-            </a:lnRef>
-            <a:fillRef idx="0">
-              <a:schemeClr val="accent1"/>
-            </a:fillRef>
-            <a:effectRef idx="0">
-              <a:schemeClr val="accent1"/>
-            </a:effectRef>
-            <a:fontRef idx="minor">
-              <a:schemeClr val="tx1"/>
-            </a:fontRef>
-          </p:style>
-        </p:cxnSp>
-        <p:cxnSp>
-          <p:nvCxnSpPr>
-            <p:cNvPr id="243" name="Straight Connector 242"/>
-            <p:cNvCxnSpPr/>
-            <p:nvPr/>
-          </p:nvCxnSpPr>
-          <p:spPr>
-            <a:xfrm rot="5400000" flipH="1">
-              <a:off x="4426630" y="4775281"/>
-              <a:ext cx="636664" cy="0"/>
-            </a:xfrm>
-            <a:prstGeom prst="line">
-              <a:avLst/>
-            </a:prstGeom>
-          </p:spPr>
-          <p:style>
-            <a:lnRef idx="1">
-              <a:schemeClr val="accent1"/>
-            </a:lnRef>
-            <a:fillRef idx="0">
-              <a:schemeClr val="accent1"/>
-            </a:fillRef>
-            <a:effectRef idx="0">
-              <a:schemeClr val="accent1"/>
-            </a:effectRef>
-            <a:fontRef idx="minor">
-              <a:schemeClr val="tx1"/>
-            </a:fontRef>
-          </p:style>
-        </p:cxnSp>
-        <p:cxnSp>
-          <p:nvCxnSpPr>
-            <p:cNvPr id="244" name="Straight Connector 243"/>
-            <p:cNvCxnSpPr/>
-            <p:nvPr/>
-          </p:nvCxnSpPr>
-          <p:spPr>
-            <a:xfrm rot="5400000" flipV="1">
-              <a:off x="4910305" y="4289748"/>
-              <a:ext cx="0" cy="330688"/>
-            </a:xfrm>
-            <a:prstGeom prst="line">
-              <a:avLst/>
-            </a:prstGeom>
-          </p:spPr>
-          <p:style>
-            <a:lnRef idx="1">
-              <a:schemeClr val="accent1"/>
-            </a:lnRef>
-            <a:fillRef idx="0">
-              <a:schemeClr val="accent1"/>
-            </a:fillRef>
-            <a:effectRef idx="0">
-              <a:schemeClr val="accent1"/>
-            </a:effectRef>
-            <a:fontRef idx="minor">
-              <a:schemeClr val="tx1"/>
-            </a:fontRef>
-          </p:style>
-        </p:cxnSp>
-        <p:cxnSp>
-          <p:nvCxnSpPr>
-            <p:cNvPr id="245" name="Straight Connector 244"/>
-            <p:cNvCxnSpPr/>
-            <p:nvPr/>
-          </p:nvCxnSpPr>
-          <p:spPr>
-            <a:xfrm rot="5400000" flipH="1">
-              <a:off x="4835537" y="4214821"/>
-              <a:ext cx="480225" cy="0"/>
-            </a:xfrm>
-            <a:prstGeom prst="line">
-              <a:avLst/>
-            </a:prstGeom>
-          </p:spPr>
-          <p:style>
-            <a:lnRef idx="1">
-              <a:schemeClr val="accent1"/>
-            </a:lnRef>
-            <a:fillRef idx="0">
-              <a:schemeClr val="accent1"/>
-            </a:fillRef>
-            <a:effectRef idx="0">
-              <a:schemeClr val="accent1"/>
-            </a:effectRef>
-            <a:fontRef idx="minor">
-              <a:schemeClr val="tx1"/>
-            </a:fontRef>
-          </p:style>
-        </p:cxnSp>
-        <p:cxnSp>
-          <p:nvCxnSpPr>
-            <p:cNvPr id="246" name="Straight Connector 245"/>
-            <p:cNvCxnSpPr/>
-            <p:nvPr/>
-          </p:nvCxnSpPr>
-          <p:spPr>
-            <a:xfrm rot="5400000">
-              <a:off x="4808083" y="3707142"/>
-              <a:ext cx="0" cy="535132"/>
-            </a:xfrm>
-            <a:prstGeom prst="line">
-              <a:avLst/>
-            </a:prstGeom>
-          </p:spPr>
-          <p:style>
-            <a:lnRef idx="1">
-              <a:schemeClr val="accent1"/>
-            </a:lnRef>
-            <a:fillRef idx="0">
-              <a:schemeClr val="accent1"/>
-            </a:fillRef>
-            <a:effectRef idx="0">
-              <a:schemeClr val="accent1"/>
-            </a:effectRef>
-            <a:fontRef idx="minor">
-              <a:schemeClr val="tx1"/>
-            </a:fontRef>
-          </p:style>
-        </p:cxnSp>
-        <p:cxnSp>
-          <p:nvCxnSpPr>
-            <p:cNvPr id="247" name="Straight Arrow Connector 246"/>
-            <p:cNvCxnSpPr/>
-            <p:nvPr/>
-          </p:nvCxnSpPr>
-          <p:spPr>
-            <a:xfrm rot="5400000">
-              <a:off x="4518259" y="4786327"/>
-              <a:ext cx="636664" cy="0"/>
-            </a:xfrm>
-            <a:prstGeom prst="straightConnector1">
-              <a:avLst/>
-            </a:prstGeom>
-            <a:ln w="12700">
-              <a:headEnd type="triangle" w="sm" len="sm"/>
-              <a:tailEnd type="triangle" w="sm" len="sm"/>
-            </a:ln>
-          </p:spPr>
-          <p:style>
-            <a:lnRef idx="1">
-              <a:schemeClr val="accent1"/>
-            </a:lnRef>
-            <a:fillRef idx="0">
-              <a:schemeClr val="accent1"/>
-            </a:fillRef>
-            <a:effectRef idx="0">
-              <a:schemeClr val="accent1"/>
-            </a:effectRef>
-            <a:fontRef idx="minor">
-              <a:schemeClr val="tx1"/>
-            </a:fontRef>
-          </p:style>
-        </p:cxnSp>
-        <p:cxnSp>
-          <p:nvCxnSpPr>
-            <p:cNvPr id="248" name="Straight Arrow Connector 247"/>
-            <p:cNvCxnSpPr/>
-            <p:nvPr/>
-          </p:nvCxnSpPr>
-          <p:spPr>
-            <a:xfrm rot="5400000">
-              <a:off x="4910479" y="4783011"/>
-              <a:ext cx="0" cy="330340"/>
-            </a:xfrm>
-            <a:prstGeom prst="straightConnector1">
-              <a:avLst/>
-            </a:prstGeom>
-            <a:ln w="12700">
-              <a:headEnd type="triangle" w="sm" len="sm"/>
-              <a:tailEnd type="triangle" w="sm" len="sm"/>
-            </a:ln>
-          </p:spPr>
-          <p:style>
-            <a:lnRef idx="1">
-              <a:schemeClr val="accent1"/>
-            </a:lnRef>
-            <a:fillRef idx="0">
-              <a:schemeClr val="accent1"/>
-            </a:fillRef>
-            <a:effectRef idx="0">
-              <a:schemeClr val="accent1"/>
-            </a:effectRef>
-            <a:fontRef idx="minor">
-              <a:schemeClr val="tx1"/>
-            </a:fontRef>
-          </p:style>
-        </p:cxnSp>
-        <p:cxnSp>
-          <p:nvCxnSpPr>
-            <p:cNvPr id="249" name="Straight Connector 248"/>
-            <p:cNvCxnSpPr/>
-            <p:nvPr/>
-          </p:nvCxnSpPr>
-          <p:spPr>
-            <a:xfrm rot="5400000" flipH="1">
-              <a:off x="4786937" y="4763061"/>
-              <a:ext cx="573703" cy="0"/>
-            </a:xfrm>
-            <a:prstGeom prst="line">
-              <a:avLst/>
-            </a:prstGeom>
-            <a:ln>
-              <a:solidFill>
-                <a:schemeClr val="bg1">
-                  <a:lumMod val="65000"/>
-                </a:schemeClr>
-              </a:solidFill>
-              <a:prstDash val="dash"/>
-            </a:ln>
-          </p:spPr>
-          <p:style>
-            <a:lnRef idx="1">
-              <a:schemeClr val="accent1"/>
-            </a:lnRef>
-            <a:fillRef idx="0">
-              <a:schemeClr val="accent1"/>
-            </a:fillRef>
-            <a:effectRef idx="0">
-              <a:schemeClr val="accent1"/>
-            </a:effectRef>
-            <a:fontRef idx="minor">
-              <a:schemeClr val="tx1"/>
-            </a:fontRef>
-          </p:style>
-        </p:cxnSp>
-        <p:cxnSp>
-          <p:nvCxnSpPr>
-            <p:cNvPr id="250" name="Straight Arrow Connector 249"/>
-            <p:cNvCxnSpPr/>
-            <p:nvPr/>
-          </p:nvCxnSpPr>
-          <p:spPr>
-            <a:xfrm rot="5400000">
-              <a:off x="5328343" y="3798879"/>
-              <a:ext cx="0" cy="492688"/>
-            </a:xfrm>
-            <a:prstGeom prst="straightConnector1">
-              <a:avLst/>
-            </a:prstGeom>
-            <a:ln w="12700">
-              <a:headEnd type="triangle" w="sm" len="sm"/>
-              <a:tailEnd type="triangle" w="sm" len="sm"/>
-            </a:ln>
-          </p:spPr>
-          <p:style>
-            <a:lnRef idx="1">
-              <a:schemeClr val="accent1"/>
-            </a:lnRef>
-            <a:fillRef idx="0">
-              <a:schemeClr val="accent1"/>
-            </a:fillRef>
-            <a:effectRef idx="0">
-              <a:schemeClr val="accent1"/>
-            </a:effectRef>
-            <a:fontRef idx="minor">
-              <a:schemeClr val="tx1"/>
-            </a:fontRef>
-          </p:style>
-        </p:cxnSp>
-        <p:cxnSp>
-          <p:nvCxnSpPr>
-            <p:cNvPr id="251" name="Straight Arrow Connector 250"/>
-            <p:cNvCxnSpPr/>
-            <p:nvPr/>
-          </p:nvCxnSpPr>
-          <p:spPr>
-            <a:xfrm rot="5400000">
-              <a:off x="5057603" y="2858939"/>
-              <a:ext cx="0" cy="1034169"/>
-            </a:xfrm>
-            <a:prstGeom prst="straightConnector1">
-              <a:avLst/>
-            </a:prstGeom>
-            <a:ln w="12700">
-              <a:headEnd type="triangle" w="sm" len="sm"/>
-              <a:tailEnd type="triangle" w="sm" len="sm"/>
-            </a:ln>
-          </p:spPr>
-          <p:style>
-            <a:lnRef idx="1">
-              <a:schemeClr val="accent1"/>
-            </a:lnRef>
-            <a:fillRef idx="0">
-              <a:schemeClr val="accent1"/>
-            </a:fillRef>
-            <a:effectRef idx="0">
-              <a:schemeClr val="accent1"/>
-            </a:effectRef>
-            <a:fontRef idx="minor">
-              <a:schemeClr val="tx1"/>
-            </a:fontRef>
-          </p:style>
-        </p:cxnSp>
-        <p:cxnSp>
-          <p:nvCxnSpPr>
-            <p:cNvPr id="252" name="Straight Arrow Connector 251"/>
-            <p:cNvCxnSpPr/>
-            <p:nvPr/>
-          </p:nvCxnSpPr>
-          <p:spPr>
-            <a:xfrm rot="5400000">
-              <a:off x="4948463" y="4221352"/>
-              <a:ext cx="493287" cy="0"/>
-            </a:xfrm>
-            <a:prstGeom prst="straightConnector1">
-              <a:avLst/>
-            </a:prstGeom>
-            <a:ln w="12700">
-              <a:headEnd type="triangle" w="sm" len="sm"/>
-              <a:tailEnd type="triangle" w="sm" len="sm"/>
-            </a:ln>
-          </p:spPr>
-          <p:style>
-            <a:lnRef idx="1">
-              <a:schemeClr val="accent1"/>
-            </a:lnRef>
-            <a:fillRef idx="0">
-              <a:schemeClr val="accent1"/>
-            </a:fillRef>
-            <a:effectRef idx="0">
-              <a:schemeClr val="accent1"/>
-            </a:effectRef>
-            <a:fontRef idx="minor">
-              <a:schemeClr val="tx1"/>
-            </a:fontRef>
-          </p:style>
-        </p:cxnSp>
-        <p:cxnSp>
-          <p:nvCxnSpPr>
-            <p:cNvPr id="253" name="Straight Connector 252"/>
-            <p:cNvCxnSpPr/>
-            <p:nvPr/>
-          </p:nvCxnSpPr>
-          <p:spPr>
-            <a:xfrm rot="5400000" flipV="1">
-              <a:off x="5066999" y="4101074"/>
-              <a:ext cx="0" cy="1323974"/>
-            </a:xfrm>
-            <a:prstGeom prst="line">
-              <a:avLst/>
-            </a:prstGeom>
-            <a:ln>
-              <a:solidFill>
-                <a:schemeClr val="bg1">
-                  <a:lumMod val="65000"/>
-                </a:schemeClr>
-              </a:solidFill>
-              <a:prstDash val="dash"/>
-            </a:ln>
-          </p:spPr>
-          <p:style>
-            <a:lnRef idx="1">
-              <a:schemeClr val="accent1"/>
-            </a:lnRef>
-            <a:fillRef idx="0">
-              <a:schemeClr val="accent1"/>
-            </a:fillRef>
-            <a:effectRef idx="0">
-              <a:schemeClr val="accent1"/>
-            </a:effectRef>
-            <a:fontRef idx="minor">
-              <a:schemeClr val="tx1"/>
-            </a:fontRef>
-          </p:style>
-        </p:cxnSp>
-        <p:cxnSp>
-          <p:nvCxnSpPr>
-            <p:cNvPr id="254" name="Straight Arrow Connector 253"/>
-            <p:cNvCxnSpPr/>
-            <p:nvPr/>
-          </p:nvCxnSpPr>
-          <p:spPr>
-            <a:xfrm rot="5400000">
-              <a:off x="4813932" y="3622446"/>
-              <a:ext cx="0" cy="523434"/>
-            </a:xfrm>
-            <a:prstGeom prst="straightConnector1">
-              <a:avLst/>
-            </a:prstGeom>
-            <a:ln w="12700">
-              <a:headEnd type="triangle" w="sm" len="sm"/>
-              <a:tailEnd type="triangle" w="sm" len="sm"/>
-            </a:ln>
-          </p:spPr>
-          <p:style>
-            <a:lnRef idx="1">
-              <a:schemeClr val="accent1"/>
-            </a:lnRef>
-            <a:fillRef idx="0">
-              <a:schemeClr val="accent1"/>
-            </a:fillRef>
-            <a:effectRef idx="0">
-              <a:schemeClr val="accent1"/>
-            </a:effectRef>
-            <a:fontRef idx="minor">
-              <a:schemeClr val="tx1"/>
-            </a:fontRef>
-          </p:style>
-        </p:cxnSp>
-        <p:cxnSp>
-          <p:nvCxnSpPr>
-            <p:cNvPr id="255" name="Straight Connector 254"/>
-            <p:cNvCxnSpPr/>
-            <p:nvPr/>
-          </p:nvCxnSpPr>
-          <p:spPr>
-            <a:xfrm rot="5400000">
-              <a:off x="5024553" y="4146419"/>
-              <a:ext cx="0" cy="72451"/>
-            </a:xfrm>
-            <a:prstGeom prst="line">
-              <a:avLst/>
-            </a:prstGeom>
-          </p:spPr>
-          <p:style>
-            <a:lnRef idx="1">
-              <a:schemeClr val="accent1"/>
-            </a:lnRef>
-            <a:fillRef idx="0">
-              <a:schemeClr val="accent1"/>
-            </a:fillRef>
-            <a:effectRef idx="0">
-              <a:schemeClr val="accent1"/>
-            </a:effectRef>
-            <a:fontRef idx="minor">
-              <a:schemeClr val="tx1"/>
-            </a:fontRef>
-          </p:style>
-        </p:cxnSp>
-        <p:cxnSp>
-          <p:nvCxnSpPr>
-            <p:cNvPr id="256" name="Straight Connector 255"/>
-            <p:cNvCxnSpPr/>
-            <p:nvPr/>
-          </p:nvCxnSpPr>
-          <p:spPr>
-            <a:xfrm rot="5400000">
-              <a:off x="4772178" y="4421179"/>
-              <a:ext cx="61158" cy="0"/>
-            </a:xfrm>
-            <a:prstGeom prst="line">
-              <a:avLst/>
-            </a:prstGeom>
-          </p:spPr>
-          <p:style>
-            <a:lnRef idx="1">
-              <a:schemeClr val="accent1"/>
-            </a:lnRef>
-            <a:fillRef idx="0">
-              <a:schemeClr val="accent1"/>
-            </a:fillRef>
-            <a:effectRef idx="0">
-              <a:schemeClr val="accent1"/>
-            </a:effectRef>
-            <a:fontRef idx="minor">
-              <a:schemeClr val="tx1"/>
-            </a:fontRef>
-          </p:style>
-        </p:cxnSp>
-        <p:cxnSp>
-          <p:nvCxnSpPr>
-            <p:cNvPr id="257" name="Straight Arrow Connector 256"/>
-            <p:cNvCxnSpPr/>
-            <p:nvPr/>
-          </p:nvCxnSpPr>
-          <p:spPr>
-            <a:xfrm rot="5400000" flipV="1">
-              <a:off x="4669672" y="3850717"/>
-              <a:ext cx="19294" cy="676481"/>
-            </a:xfrm>
-            <a:prstGeom prst="straightConnector1">
-              <a:avLst/>
-            </a:prstGeom>
-            <a:ln w="12700">
-              <a:headEnd type="none" w="sm" len="sm"/>
-              <a:tailEnd type="triangle" w="sm" len="sm"/>
-            </a:ln>
-          </p:spPr>
-          <p:style>
-            <a:lnRef idx="1">
-              <a:schemeClr val="accent1"/>
-            </a:lnRef>
-            <a:fillRef idx="0">
-              <a:schemeClr val="accent1"/>
-            </a:fillRef>
-            <a:effectRef idx="0">
-              <a:schemeClr val="accent1"/>
-            </a:effectRef>
-            <a:fontRef idx="minor">
-              <a:schemeClr val="tx1"/>
-            </a:fontRef>
-          </p:style>
-        </p:cxnSp>
-        <p:cxnSp>
-          <p:nvCxnSpPr>
-            <p:cNvPr id="258" name="Straight Arrow Connector 257"/>
-            <p:cNvCxnSpPr/>
-            <p:nvPr/>
-          </p:nvCxnSpPr>
-          <p:spPr>
-            <a:xfrm rot="5400000" flipH="1" flipV="1">
-              <a:off x="4347617" y="4297476"/>
-              <a:ext cx="279993" cy="527399"/>
-            </a:xfrm>
-            <a:prstGeom prst="straightConnector1">
-              <a:avLst/>
-            </a:prstGeom>
-            <a:ln w="12700">
-              <a:headEnd type="none" w="sm" len="sm"/>
-              <a:tailEnd type="triangle" w="sm" len="sm"/>
-            </a:ln>
-          </p:spPr>
-          <p:style>
-            <a:lnRef idx="1">
-              <a:schemeClr val="accent1"/>
-            </a:lnRef>
-            <a:fillRef idx="0">
-              <a:schemeClr val="accent1"/>
-            </a:fillRef>
-            <a:effectRef idx="0">
-              <a:schemeClr val="accent1"/>
-            </a:effectRef>
-            <a:fontRef idx="minor">
-              <a:schemeClr val="tx1"/>
-            </a:fontRef>
-          </p:style>
-        </p:cxnSp>
-        <p:cxnSp>
-          <p:nvCxnSpPr>
-            <p:cNvPr id="259" name="Straight Arrow Connector 258"/>
-            <p:cNvCxnSpPr/>
-            <p:nvPr/>
-          </p:nvCxnSpPr>
-          <p:spPr>
-            <a:xfrm rot="5400000">
-              <a:off x="4585639" y="3723756"/>
-              <a:ext cx="501904" cy="0"/>
-            </a:xfrm>
-            <a:prstGeom prst="straightConnector1">
-              <a:avLst/>
-            </a:prstGeom>
-            <a:ln w="12700">
-              <a:headEnd type="triangle" w="sm" len="sm"/>
-              <a:tailEnd type="triangle" w="sm" len="sm"/>
-            </a:ln>
-          </p:spPr>
-          <p:style>
-            <a:lnRef idx="1">
-              <a:schemeClr val="accent1"/>
-            </a:lnRef>
-            <a:fillRef idx="0">
-              <a:schemeClr val="accent1"/>
-            </a:fillRef>
-            <a:effectRef idx="0">
-              <a:schemeClr val="accent1"/>
-            </a:effectRef>
-            <a:fontRef idx="minor">
-              <a:schemeClr val="tx1"/>
-            </a:fontRef>
-          </p:style>
-        </p:cxnSp>
-        <p:sp>
-          <p:nvSpPr>
-            <p:cNvPr id="260" name="TextBox 259"/>
-            <p:cNvSpPr txBox="1"/>
-            <p:nvPr/>
-          </p:nvSpPr>
-          <p:spPr>
-            <a:xfrm>
-              <a:off x="5765014" y="3586631"/>
-              <a:ext cx="787395" cy="215444"/>
-            </a:xfrm>
-            <a:prstGeom prst="rect">
-              <a:avLst/>
-            </a:prstGeom>
-            <a:noFill/>
-          </p:spPr>
-          <p:txBody>
-            <a:bodyPr wrap="none" rtlCol="0">
-              <a:spAutoFit/>
-            </a:bodyPr>
-            <a:lstStyle/>
-            <a:p>
-              <a:r>
-                <a:rPr lang="en-GB" sz="800" dirty="0" err="1"/>
-                <a:t>yokeThickness</a:t>
-              </a:r>
-              <a:endParaRPr lang="en-GB" sz="800" dirty="0"/>
-            </a:p>
-          </p:txBody>
-        </p:sp>
-        <p:sp>
-          <p:nvSpPr>
-            <p:cNvPr id="261" name="TextBox 260"/>
-            <p:cNvSpPr txBox="1"/>
-            <p:nvPr/>
-          </p:nvSpPr>
-          <p:spPr>
-            <a:xfrm>
-              <a:off x="4775915" y="3469615"/>
-              <a:ext cx="787395" cy="215444"/>
-            </a:xfrm>
-            <a:prstGeom prst="rect">
-              <a:avLst/>
-            </a:prstGeom>
-            <a:noFill/>
-          </p:spPr>
-          <p:txBody>
-            <a:bodyPr wrap="none" rtlCol="0">
-              <a:spAutoFit/>
-            </a:bodyPr>
-            <a:lstStyle/>
-            <a:p>
-              <a:r>
-                <a:rPr lang="en-GB" sz="800"/>
-                <a:t>yokeThickness</a:t>
-              </a:r>
-              <a:endParaRPr lang="en-GB" sz="800" dirty="0"/>
-            </a:p>
-          </p:txBody>
-        </p:sp>
-        <p:sp>
-          <p:nvSpPr>
-            <p:cNvPr id="262" name="TextBox 261"/>
-            <p:cNvSpPr txBox="1"/>
-            <p:nvPr/>
-          </p:nvSpPr>
-          <p:spPr>
-            <a:xfrm>
-              <a:off x="4649239" y="3111108"/>
-              <a:ext cx="829073" cy="215444"/>
-            </a:xfrm>
-            <a:prstGeom prst="rect">
-              <a:avLst/>
-            </a:prstGeom>
-            <a:noFill/>
-          </p:spPr>
-          <p:txBody>
-            <a:bodyPr wrap="none" rtlCol="0">
-              <a:spAutoFit/>
-            </a:bodyPr>
-            <a:lstStyle/>
-            <a:p>
-              <a:r>
-                <a:rPr lang="en-GB" sz="800" dirty="0" err="1"/>
-                <a:t>yokeHalfHeight</a:t>
-              </a:r>
-              <a:endParaRPr lang="en-GB" sz="800" dirty="0"/>
-            </a:p>
-          </p:txBody>
-        </p:sp>
-        <p:cxnSp>
-          <p:nvCxnSpPr>
-            <p:cNvPr id="263" name="Straight Arrow Connector 262"/>
-            <p:cNvCxnSpPr/>
-            <p:nvPr/>
-          </p:nvCxnSpPr>
-          <p:spPr>
-            <a:xfrm rot="5400000">
-              <a:off x="4328745" y="4773671"/>
-              <a:ext cx="2630627" cy="0"/>
-            </a:xfrm>
-            <a:prstGeom prst="straightConnector1">
-              <a:avLst/>
-            </a:prstGeom>
-            <a:ln w="12700">
-              <a:headEnd type="triangle" w="sm" len="sm"/>
-              <a:tailEnd type="triangle" w="sm" len="sm"/>
-            </a:ln>
-          </p:spPr>
-          <p:style>
-            <a:lnRef idx="1">
-              <a:schemeClr val="accent1"/>
-            </a:lnRef>
-            <a:fillRef idx="0">
-              <a:schemeClr val="accent1"/>
-            </a:fillRef>
-            <a:effectRef idx="0">
-              <a:schemeClr val="accent1"/>
-            </a:effectRef>
-            <a:fontRef idx="minor">
-              <a:schemeClr val="tx1"/>
-            </a:fontRef>
-          </p:style>
-        </p:cxnSp>
-        <p:sp>
-          <p:nvSpPr>
-            <p:cNvPr id="264" name="TextBox 263"/>
-            <p:cNvSpPr txBox="1"/>
-            <p:nvPr/>
-          </p:nvSpPr>
-          <p:spPr>
-            <a:xfrm>
-              <a:off x="5614877" y="4121753"/>
-              <a:ext cx="641522" cy="215444"/>
-            </a:xfrm>
-            <a:prstGeom prst="rect">
-              <a:avLst/>
-            </a:prstGeom>
-            <a:noFill/>
-          </p:spPr>
-          <p:txBody>
-            <a:bodyPr wrap="none" rtlCol="0">
-              <a:spAutoFit/>
-            </a:bodyPr>
-            <a:lstStyle/>
-            <a:p>
-              <a:r>
-                <a:rPr lang="en-GB" sz="800" dirty="0" err="1"/>
-                <a:t>yokeWidth</a:t>
-              </a:r>
-              <a:endParaRPr lang="en-GB" sz="800" dirty="0"/>
-            </a:p>
-          </p:txBody>
-        </p:sp>
-        <p:sp>
-          <p:nvSpPr>
-            <p:cNvPr id="265" name="TextBox 264"/>
-            <p:cNvSpPr txBox="1"/>
-            <p:nvPr/>
-          </p:nvSpPr>
-          <p:spPr>
-            <a:xfrm>
-              <a:off x="5014932" y="4940217"/>
-              <a:ext cx="627095" cy="215444"/>
-            </a:xfrm>
-            <a:prstGeom prst="rect">
-              <a:avLst/>
-            </a:prstGeom>
-            <a:noFill/>
-          </p:spPr>
-          <p:txBody>
-            <a:bodyPr wrap="none" rtlCol="0">
-              <a:spAutoFit/>
-            </a:bodyPr>
-            <a:lstStyle/>
-            <a:p>
-              <a:r>
-                <a:rPr lang="en-GB" sz="800" dirty="0" err="1"/>
-                <a:t>poleWidth</a:t>
-              </a:r>
-              <a:endParaRPr lang="en-GB" sz="800" dirty="0"/>
-            </a:p>
-          </p:txBody>
-        </p:sp>
-        <p:sp>
-          <p:nvSpPr>
-            <p:cNvPr id="266" name="TextBox 265"/>
-            <p:cNvSpPr txBox="1"/>
-            <p:nvPr/>
-          </p:nvSpPr>
-          <p:spPr>
-            <a:xfrm>
-              <a:off x="4995984" y="5468502"/>
-              <a:ext cx="644728" cy="215444"/>
-            </a:xfrm>
-            <a:prstGeom prst="rect">
-              <a:avLst/>
-            </a:prstGeom>
-            <a:noFill/>
-          </p:spPr>
-          <p:txBody>
-            <a:bodyPr wrap="none" rtlCol="0">
-              <a:spAutoFit/>
-            </a:bodyPr>
-            <a:lstStyle/>
-            <a:p>
-              <a:r>
-                <a:rPr lang="en-GB" sz="800" dirty="0" err="1"/>
-                <a:t>poleHeight</a:t>
-              </a:r>
-              <a:endParaRPr lang="en-GB" sz="800" dirty="0"/>
-            </a:p>
-          </p:txBody>
-        </p:sp>
-        <p:cxnSp>
-          <p:nvCxnSpPr>
-            <p:cNvPr id="267" name="Straight Arrow Connector 266"/>
-            <p:cNvCxnSpPr/>
-            <p:nvPr/>
-          </p:nvCxnSpPr>
-          <p:spPr>
-            <a:xfrm rot="5400000" flipH="1">
-              <a:off x="4996844" y="4657470"/>
-              <a:ext cx="196406" cy="469502"/>
-            </a:xfrm>
-            <a:prstGeom prst="straightConnector1">
-              <a:avLst/>
-            </a:prstGeom>
-            <a:ln w="12700">
-              <a:solidFill>
-                <a:schemeClr val="bg1">
-                  <a:lumMod val="65000"/>
-                  <a:alpha val="50000"/>
-                </a:schemeClr>
-              </a:solidFill>
-              <a:prstDash val="sysDash"/>
-              <a:headEnd w="sm" len="sm"/>
-              <a:tailEnd type="triangle" w="sm" len="sm"/>
-            </a:ln>
-          </p:spPr>
-          <p:style>
-            <a:lnRef idx="1">
-              <a:schemeClr val="accent1"/>
-            </a:lnRef>
-            <a:fillRef idx="0">
-              <a:schemeClr val="accent1"/>
-            </a:fillRef>
-            <a:effectRef idx="0">
-              <a:schemeClr val="accent1"/>
-            </a:effectRef>
-            <a:fontRef idx="minor">
-              <a:schemeClr val="tx1"/>
-            </a:fontRef>
-          </p:style>
-        </p:cxnSp>
-        <p:cxnSp>
-          <p:nvCxnSpPr>
-            <p:cNvPr id="268" name="Straight Arrow Connector 267"/>
-            <p:cNvCxnSpPr/>
-            <p:nvPr/>
-          </p:nvCxnSpPr>
-          <p:spPr>
-            <a:xfrm rot="5400000" flipH="1">
-              <a:off x="4872323" y="5038969"/>
-              <a:ext cx="540535" cy="425296"/>
-            </a:xfrm>
-            <a:prstGeom prst="straightConnector1">
-              <a:avLst/>
-            </a:prstGeom>
-            <a:ln w="12700">
-              <a:solidFill>
-                <a:schemeClr val="bg1">
-                  <a:lumMod val="65000"/>
-                  <a:alpha val="50000"/>
-                </a:schemeClr>
-              </a:solidFill>
-              <a:prstDash val="sysDash"/>
-              <a:headEnd w="sm" len="sm"/>
-              <a:tailEnd type="triangle" w="sm" len="sm"/>
-            </a:ln>
-          </p:spPr>
-          <p:style>
-            <a:lnRef idx="1">
-              <a:schemeClr val="accent1"/>
-            </a:lnRef>
-            <a:fillRef idx="0">
-              <a:schemeClr val="accent1"/>
-            </a:fillRef>
-            <a:effectRef idx="0">
-              <a:schemeClr val="accent1"/>
-            </a:effectRef>
-            <a:fontRef idx="minor">
-              <a:schemeClr val="tx1"/>
-            </a:fontRef>
-          </p:style>
-        </p:cxnSp>
-        <p:sp>
-          <p:nvSpPr>
-            <p:cNvPr id="269" name="TextBox 268"/>
-            <p:cNvSpPr txBox="1"/>
-            <p:nvPr/>
-          </p:nvSpPr>
-          <p:spPr>
-            <a:xfrm>
-              <a:off x="3824026" y="3443570"/>
-              <a:ext cx="880369" cy="215444"/>
-            </a:xfrm>
-            <a:prstGeom prst="rect">
-              <a:avLst/>
-            </a:prstGeom>
-            <a:noFill/>
-          </p:spPr>
-          <p:txBody>
-            <a:bodyPr wrap="none" rtlCol="0">
-              <a:spAutoFit/>
-            </a:bodyPr>
-            <a:lstStyle/>
-            <a:p>
-              <a:r>
-                <a:rPr lang="en-GB" sz="800"/>
-                <a:t>yokeInnerHeight</a:t>
-              </a:r>
-              <a:endParaRPr lang="en-GB" sz="800" dirty="0"/>
-            </a:p>
-          </p:txBody>
-        </p:sp>
-        <p:cxnSp>
-          <p:nvCxnSpPr>
-            <p:cNvPr id="270" name="Straight Arrow Connector 269"/>
-            <p:cNvCxnSpPr/>
-            <p:nvPr/>
-          </p:nvCxnSpPr>
-          <p:spPr>
-            <a:xfrm rot="5400000" flipV="1">
-              <a:off x="4432074" y="3567685"/>
-              <a:ext cx="198122" cy="355937"/>
-            </a:xfrm>
-            <a:prstGeom prst="straightConnector1">
-              <a:avLst/>
-            </a:prstGeom>
-            <a:ln w="12700">
-              <a:solidFill>
-                <a:schemeClr val="bg1">
-                  <a:lumMod val="65000"/>
-                  <a:alpha val="50000"/>
-                </a:schemeClr>
-              </a:solidFill>
-              <a:prstDash val="sysDash"/>
-              <a:headEnd w="sm" len="sm"/>
-              <a:tailEnd type="triangle" w="sm" len="sm"/>
-            </a:ln>
-          </p:spPr>
-          <p:style>
-            <a:lnRef idx="1">
-              <a:schemeClr val="accent1"/>
-            </a:lnRef>
-            <a:fillRef idx="0">
-              <a:schemeClr val="accent1"/>
-            </a:fillRef>
-            <a:effectRef idx="0">
-              <a:schemeClr val="accent1"/>
-            </a:effectRef>
-            <a:fontRef idx="minor">
-              <a:schemeClr val="tx1"/>
-            </a:fontRef>
-          </p:style>
-        </p:cxnSp>
-        <p:sp>
-          <p:nvSpPr>
-            <p:cNvPr id="271" name="TextBox 270"/>
-            <p:cNvSpPr txBox="1"/>
-            <p:nvPr/>
-          </p:nvSpPr>
-          <p:spPr>
-            <a:xfrm>
-              <a:off x="3754631" y="4699423"/>
-              <a:ext cx="785793" cy="215444"/>
-            </a:xfrm>
-            <a:prstGeom prst="rect">
-              <a:avLst/>
-            </a:prstGeom>
-            <a:noFill/>
-          </p:spPr>
-          <p:txBody>
-            <a:bodyPr wrap="none" rtlCol="0">
-              <a:spAutoFit/>
-            </a:bodyPr>
-            <a:lstStyle/>
-            <a:p>
-              <a:r>
-                <a:rPr lang="en-GB" sz="800"/>
-                <a:t>coilToPoleGap</a:t>
-              </a:r>
-              <a:endParaRPr lang="en-GB" sz="800" dirty="0"/>
-            </a:p>
-          </p:txBody>
-        </p:sp>
-        <p:sp>
-          <p:nvSpPr>
-            <p:cNvPr id="272" name="TextBox 271"/>
-            <p:cNvSpPr txBox="1"/>
-            <p:nvPr/>
-          </p:nvSpPr>
-          <p:spPr>
-            <a:xfrm>
-              <a:off x="3587510" y="4059444"/>
-              <a:ext cx="805029" cy="215444"/>
-            </a:xfrm>
-            <a:prstGeom prst="rect">
-              <a:avLst/>
-            </a:prstGeom>
-            <a:noFill/>
-          </p:spPr>
-          <p:txBody>
-            <a:bodyPr wrap="none" rtlCol="0">
-              <a:spAutoFit/>
-            </a:bodyPr>
-            <a:lstStyle/>
-            <a:p>
-              <a:r>
-                <a:rPr lang="en-GB" sz="800" dirty="0" err="1"/>
-                <a:t>coilToYokeGap</a:t>
-              </a:r>
-              <a:endParaRPr lang="en-GB" sz="800" dirty="0"/>
-            </a:p>
-          </p:txBody>
-        </p:sp>
-        <p:sp>
-          <p:nvSpPr>
-            <p:cNvPr id="273" name="TextBox 272"/>
-            <p:cNvSpPr txBox="1"/>
-            <p:nvPr/>
-          </p:nvSpPr>
-          <p:spPr>
-            <a:xfrm>
-              <a:off x="5728425" y="4483347"/>
-              <a:ext cx="800219" cy="215444"/>
-            </a:xfrm>
-            <a:prstGeom prst="rect">
-              <a:avLst/>
-            </a:prstGeom>
-            <a:noFill/>
-          </p:spPr>
-          <p:txBody>
-            <a:bodyPr wrap="none" rtlCol="0">
-              <a:spAutoFit/>
-            </a:bodyPr>
-            <a:lstStyle/>
-            <a:p>
-              <a:r>
-                <a:rPr lang="en-GB" sz="800"/>
-                <a:t>yokeOverHang</a:t>
-              </a:r>
-              <a:endParaRPr lang="en-GB" sz="800" dirty="0"/>
-            </a:p>
-          </p:txBody>
-        </p:sp>
-        <p:cxnSp>
-          <p:nvCxnSpPr>
-            <p:cNvPr id="274" name="Straight Arrow Connector 273"/>
-            <p:cNvCxnSpPr/>
-            <p:nvPr/>
-          </p:nvCxnSpPr>
-          <p:spPr>
-            <a:xfrm flipH="1" flipV="1">
-              <a:off x="5213737" y="4349284"/>
-              <a:ext cx="538953" cy="244812"/>
-            </a:xfrm>
-            <a:prstGeom prst="straightConnector1">
-              <a:avLst/>
-            </a:prstGeom>
-            <a:ln w="12700">
-              <a:solidFill>
-                <a:schemeClr val="bg1">
-                  <a:lumMod val="65000"/>
-                  <a:alpha val="50000"/>
-                </a:schemeClr>
-              </a:solidFill>
-              <a:prstDash val="sysDash"/>
-              <a:headEnd w="sm" len="sm"/>
-              <a:tailEnd type="triangle" w="sm" len="sm"/>
-            </a:ln>
-          </p:spPr>
-          <p:style>
-            <a:lnRef idx="1">
-              <a:schemeClr val="accent1"/>
-            </a:lnRef>
-            <a:fillRef idx="0">
-              <a:schemeClr val="accent1"/>
-            </a:fillRef>
-            <a:effectRef idx="0">
-              <a:schemeClr val="accent1"/>
-            </a:effectRef>
-            <a:fontRef idx="minor">
-              <a:schemeClr val="tx1"/>
-            </a:fontRef>
-          </p:style>
-        </p:cxnSp>
-        <p:sp>
-          <p:nvSpPr>
-            <p:cNvPr id="275" name="TextBox 274"/>
-            <p:cNvSpPr txBox="1"/>
-            <p:nvPr/>
-          </p:nvSpPr>
-          <p:spPr>
-            <a:xfrm>
-              <a:off x="4522226" y="5559101"/>
-              <a:ext cx="606256" cy="215444"/>
-            </a:xfrm>
-            <a:prstGeom prst="rect">
-              <a:avLst/>
-            </a:prstGeom>
-            <a:noFill/>
-          </p:spPr>
-          <p:txBody>
-            <a:bodyPr wrap="none" rtlCol="0">
-              <a:spAutoFit/>
-            </a:bodyPr>
-            <a:lstStyle/>
-            <a:p>
-              <a:r>
-                <a:rPr lang="en-GB" sz="800" dirty="0" err="1"/>
-                <a:t>coilHeight</a:t>
-              </a:r>
-              <a:endParaRPr lang="en-GB" sz="800" dirty="0"/>
-            </a:p>
-          </p:txBody>
-        </p:sp>
-        <p:sp>
-          <p:nvSpPr>
-            <p:cNvPr id="276" name="TextBox 275"/>
-            <p:cNvSpPr txBox="1"/>
-            <p:nvPr/>
-          </p:nvSpPr>
-          <p:spPr>
-            <a:xfrm>
-              <a:off x="4005660" y="5245898"/>
-              <a:ext cx="588623" cy="215444"/>
-            </a:xfrm>
-            <a:prstGeom prst="rect">
-              <a:avLst/>
-            </a:prstGeom>
-            <a:noFill/>
-          </p:spPr>
-          <p:txBody>
-            <a:bodyPr wrap="none" rtlCol="0">
-              <a:spAutoFit/>
-            </a:bodyPr>
-            <a:lstStyle/>
-            <a:p>
-              <a:r>
-                <a:rPr lang="en-GB" sz="800" dirty="0" err="1"/>
-                <a:t>coilWidth</a:t>
-              </a:r>
-              <a:endParaRPr lang="en-GB" sz="800" dirty="0"/>
-            </a:p>
-          </p:txBody>
-        </p:sp>
-        <p:grpSp>
-          <p:nvGrpSpPr>
-            <p:cNvPr id="277" name="Group 276"/>
-            <p:cNvGrpSpPr/>
-            <p:nvPr/>
-          </p:nvGrpSpPr>
-          <p:grpSpPr>
-            <a:xfrm rot="5400000" flipH="1">
-              <a:off x="4797438" y="5313724"/>
-              <a:ext cx="516351" cy="1034170"/>
-              <a:chOff x="1276191" y="3973223"/>
-              <a:chExt cx="516351" cy="1034170"/>
-            </a:xfrm>
-          </p:grpSpPr>
-          <p:cxnSp>
-            <p:nvCxnSpPr>
-              <p:cNvPr id="278" name="Straight Connector 277"/>
-              <p:cNvCxnSpPr/>
-              <p:nvPr/>
-            </p:nvCxnSpPr>
-            <p:spPr>
-              <a:xfrm>
-                <a:off x="1276191" y="3973223"/>
-                <a:ext cx="0" cy="1034169"/>
-              </a:xfrm>
-              <a:prstGeom prst="line">
-                <a:avLst/>
-              </a:prstGeom>
-            </p:spPr>
-            <p:style>
-              <a:lnRef idx="1">
-                <a:schemeClr val="accent1"/>
-              </a:lnRef>
-              <a:fillRef idx="0">
-                <a:schemeClr val="accent1"/>
-              </a:fillRef>
-              <a:effectRef idx="0">
-                <a:schemeClr val="accent1"/>
-              </a:effectRef>
-              <a:fontRef idx="minor">
-                <a:schemeClr val="tx1"/>
-              </a:fontRef>
-            </p:style>
-          </p:cxnSp>
-          <p:cxnSp>
-            <p:nvCxnSpPr>
-              <p:cNvPr id="279" name="Straight Connector 278"/>
-              <p:cNvCxnSpPr/>
-              <p:nvPr/>
-            </p:nvCxnSpPr>
-            <p:spPr>
-              <a:xfrm>
-                <a:off x="1792542" y="4472261"/>
-                <a:ext cx="0" cy="535132"/>
-              </a:xfrm>
-              <a:prstGeom prst="line">
-                <a:avLst/>
-              </a:prstGeom>
-            </p:spPr>
-            <p:style>
-              <a:lnRef idx="1">
-                <a:schemeClr val="accent1"/>
-              </a:lnRef>
-              <a:fillRef idx="0">
-                <a:schemeClr val="accent1"/>
-              </a:fillRef>
-              <a:effectRef idx="0">
-                <a:schemeClr val="accent1"/>
-              </a:effectRef>
-              <a:fontRef idx="minor">
-                <a:schemeClr val="tx1"/>
-              </a:fontRef>
-            </p:style>
-          </p:cxnSp>
-        </p:grpSp>
-        <p:sp>
-          <p:nvSpPr>
-            <p:cNvPr id="280" name="Rectangle 279"/>
-            <p:cNvSpPr/>
-            <p:nvPr/>
-          </p:nvSpPr>
-          <p:spPr>
-            <a:xfrm rot="5400000">
-              <a:off x="4699778" y="5202717"/>
-              <a:ext cx="330214" cy="239843"/>
-            </a:xfrm>
-            <a:prstGeom prst="rect">
-              <a:avLst/>
-            </a:prstGeom>
-            <a:solidFill>
-              <a:schemeClr val="bg1">
-                <a:lumMod val="85000"/>
-              </a:schemeClr>
-            </a:solidFill>
-            <a:ln>
-              <a:noFill/>
-            </a:ln>
-          </p:spPr>
-          <p:style>
-            <a:lnRef idx="2">
-              <a:schemeClr val="accent1">
-                <a:shade val="50000"/>
-              </a:schemeClr>
-            </a:lnRef>
-            <a:fillRef idx="1">
-              <a:schemeClr val="accent1"/>
-            </a:fillRef>
-            <a:effectRef idx="0">
-              <a:schemeClr val="accent1"/>
-            </a:effectRef>
-            <a:fontRef idx="minor">
-              <a:schemeClr val="lt1"/>
-            </a:fontRef>
-          </p:style>
-          <p:txBody>
-            <a:bodyPr rtlCol="0" anchor="ctr"/>
-            <a:lstStyle/>
-            <a:p>
-              <a:pPr algn="ctr"/>
-              <a:endParaRPr lang="en-GB"/>
-            </a:p>
-          </p:txBody>
-        </p:sp>
-        <p:cxnSp>
-          <p:nvCxnSpPr>
-            <p:cNvPr id="281" name="Straight Connector 280"/>
-            <p:cNvCxnSpPr/>
-            <p:nvPr/>
-          </p:nvCxnSpPr>
-          <p:spPr>
-            <a:xfrm rot="5400000" flipV="1">
-              <a:off x="4910305" y="4928428"/>
-              <a:ext cx="0" cy="330688"/>
-            </a:xfrm>
-            <a:prstGeom prst="line">
-              <a:avLst/>
-            </a:prstGeom>
-          </p:spPr>
-          <p:style>
-            <a:lnRef idx="1">
-              <a:schemeClr val="accent1"/>
-            </a:lnRef>
-            <a:fillRef idx="0">
-              <a:schemeClr val="accent1"/>
-            </a:fillRef>
-            <a:effectRef idx="0">
-              <a:schemeClr val="accent1"/>
-            </a:effectRef>
-            <a:fontRef idx="minor">
-              <a:schemeClr val="tx1"/>
-            </a:fontRef>
-          </p:style>
-        </p:cxnSp>
-        <p:cxnSp>
-          <p:nvCxnSpPr>
-            <p:cNvPr id="282" name="Straight Connector 281"/>
-            <p:cNvCxnSpPr/>
-            <p:nvPr/>
-          </p:nvCxnSpPr>
-          <p:spPr>
-            <a:xfrm rot="5400000" flipH="1">
-              <a:off x="4835537" y="5335519"/>
-              <a:ext cx="480225" cy="0"/>
-            </a:xfrm>
-            <a:prstGeom prst="line">
-              <a:avLst/>
-            </a:prstGeom>
-          </p:spPr>
-          <p:style>
-            <a:lnRef idx="1">
-              <a:schemeClr val="accent1"/>
-            </a:lnRef>
-            <a:fillRef idx="0">
-              <a:schemeClr val="accent1"/>
-            </a:fillRef>
-            <a:effectRef idx="0">
-              <a:schemeClr val="accent1"/>
-            </a:effectRef>
-            <a:fontRef idx="minor">
-              <a:schemeClr val="tx1"/>
-            </a:fontRef>
-          </p:style>
-        </p:cxnSp>
-        <p:cxnSp>
-          <p:nvCxnSpPr>
-            <p:cNvPr id="283" name="Straight Arrow Connector 282"/>
-            <p:cNvCxnSpPr/>
-            <p:nvPr/>
-          </p:nvCxnSpPr>
-          <p:spPr>
-            <a:xfrm rot="5400000">
-              <a:off x="4515613" y="5323517"/>
-              <a:ext cx="328457" cy="0"/>
-            </a:xfrm>
-            <a:prstGeom prst="straightConnector1">
-              <a:avLst/>
-            </a:prstGeom>
-            <a:ln w="12700">
-              <a:headEnd type="triangle" w="sm" len="sm"/>
-              <a:tailEnd type="triangle" w="sm" len="sm"/>
-            </a:ln>
-          </p:spPr>
-          <p:style>
-            <a:lnRef idx="1">
-              <a:schemeClr val="accent1"/>
-            </a:lnRef>
-            <a:fillRef idx="0">
-              <a:schemeClr val="accent1"/>
-            </a:fillRef>
-            <a:effectRef idx="0">
-              <a:schemeClr val="accent1"/>
-            </a:effectRef>
-            <a:fontRef idx="minor">
-              <a:schemeClr val="tx1"/>
-            </a:fontRef>
-          </p:style>
-        </p:cxnSp>
-        <p:cxnSp>
-          <p:nvCxnSpPr>
-            <p:cNvPr id="284" name="Straight Arrow Connector 283"/>
-            <p:cNvCxnSpPr/>
-            <p:nvPr/>
-          </p:nvCxnSpPr>
-          <p:spPr>
-            <a:xfrm rot="5400000">
-              <a:off x="4864998" y="5185443"/>
-              <a:ext cx="0" cy="239841"/>
-            </a:xfrm>
-            <a:prstGeom prst="straightConnector1">
-              <a:avLst/>
-            </a:prstGeom>
-            <a:ln w="12700">
-              <a:headEnd type="triangle" w="sm" len="sm"/>
-              <a:tailEnd type="triangle" w="sm" len="sm"/>
-            </a:ln>
-          </p:spPr>
-          <p:style>
-            <a:lnRef idx="1">
-              <a:schemeClr val="accent1"/>
-            </a:lnRef>
-            <a:fillRef idx="0">
-              <a:schemeClr val="accent1"/>
-            </a:fillRef>
-            <a:effectRef idx="0">
-              <a:schemeClr val="accent1"/>
-            </a:effectRef>
-            <a:fontRef idx="minor">
-              <a:schemeClr val="tx1"/>
-            </a:fontRef>
-          </p:style>
-        </p:cxnSp>
-        <p:cxnSp>
-          <p:nvCxnSpPr>
-            <p:cNvPr id="285" name="Straight Arrow Connector 284"/>
-            <p:cNvCxnSpPr/>
-            <p:nvPr/>
-          </p:nvCxnSpPr>
-          <p:spPr>
-            <a:xfrm rot="5400000" flipH="1" flipV="1">
-              <a:off x="4697670" y="5441339"/>
-              <a:ext cx="286127" cy="58217"/>
-            </a:xfrm>
-            <a:prstGeom prst="straightConnector1">
-              <a:avLst/>
-            </a:prstGeom>
-            <a:ln w="12700">
-              <a:solidFill>
-                <a:schemeClr val="bg1">
-                  <a:lumMod val="65000"/>
-                  <a:alpha val="50000"/>
-                </a:schemeClr>
-              </a:solidFill>
-              <a:prstDash val="sysDash"/>
-              <a:headEnd w="sm" len="sm"/>
-              <a:tailEnd type="triangle" w="sm" len="sm"/>
-            </a:ln>
-          </p:spPr>
-          <p:style>
-            <a:lnRef idx="1">
-              <a:schemeClr val="accent1"/>
-            </a:lnRef>
-            <a:fillRef idx="0">
-              <a:schemeClr val="accent1"/>
-            </a:fillRef>
-            <a:effectRef idx="0">
-              <a:schemeClr val="accent1"/>
-            </a:effectRef>
-            <a:fontRef idx="minor">
-              <a:schemeClr val="tx1"/>
-            </a:fontRef>
-          </p:style>
-        </p:cxnSp>
-        <p:cxnSp>
-          <p:nvCxnSpPr>
-            <p:cNvPr id="286" name="Straight Arrow Connector 285"/>
-            <p:cNvCxnSpPr/>
-            <p:nvPr/>
-          </p:nvCxnSpPr>
-          <p:spPr>
-            <a:xfrm rot="5400000">
-              <a:off x="5428410" y="3643683"/>
-              <a:ext cx="249233" cy="452210"/>
-            </a:xfrm>
-            <a:prstGeom prst="straightConnector1">
-              <a:avLst/>
-            </a:prstGeom>
-            <a:ln w="12700">
-              <a:solidFill>
-                <a:schemeClr val="bg1">
-                  <a:lumMod val="65000"/>
-                  <a:alpha val="50000"/>
-                </a:schemeClr>
-              </a:solidFill>
-              <a:prstDash val="sysDash"/>
-              <a:headEnd w="sm" len="sm"/>
-              <a:tailEnd type="triangle" w="sm" len="sm"/>
-            </a:ln>
-          </p:spPr>
-          <p:style>
-            <a:lnRef idx="1">
-              <a:schemeClr val="accent1"/>
-            </a:lnRef>
-            <a:fillRef idx="0">
-              <a:schemeClr val="accent1"/>
-            </a:fillRef>
-            <a:effectRef idx="0">
-              <a:schemeClr val="accent1"/>
-            </a:effectRef>
-            <a:fontRef idx="minor">
-              <a:schemeClr val="tx1"/>
-            </a:fontRef>
-          </p:style>
-        </p:cxnSp>
-        <p:cxnSp>
-          <p:nvCxnSpPr>
-            <p:cNvPr id="221" name="Straight Arrow Connector 220"/>
-            <p:cNvCxnSpPr/>
-            <p:nvPr/>
-          </p:nvCxnSpPr>
-          <p:spPr>
-            <a:xfrm flipH="1">
-              <a:off x="4551442" y="4817887"/>
-              <a:ext cx="201027" cy="0"/>
-            </a:xfrm>
-            <a:prstGeom prst="straightConnector1">
-              <a:avLst/>
-            </a:prstGeom>
-            <a:ln w="12700">
-              <a:headEnd type="triangle" w="sm" len="sm"/>
-              <a:tailEnd type="triangle" w="sm" len="sm"/>
-            </a:ln>
-          </p:spPr>
-          <p:style>
-            <a:lnRef idx="1">
-              <a:schemeClr val="accent1"/>
-            </a:lnRef>
-            <a:fillRef idx="0">
-              <a:schemeClr val="accent1"/>
-            </a:fillRef>
-            <a:effectRef idx="0">
-              <a:schemeClr val="accent1"/>
-            </a:effectRef>
-            <a:fontRef idx="minor">
-              <a:schemeClr val="tx1"/>
-            </a:fontRef>
-          </p:style>
-        </p:cxnSp>
-        <p:sp>
-          <p:nvSpPr>
-            <p:cNvPr id="222" name="TextBox 221"/>
-            <p:cNvSpPr txBox="1"/>
-            <p:nvPr/>
-          </p:nvSpPr>
-          <p:spPr>
-            <a:xfrm>
-              <a:off x="3758456" y="4974167"/>
-              <a:ext cx="707245" cy="215444"/>
-            </a:xfrm>
-            <a:prstGeom prst="rect">
-              <a:avLst/>
-            </a:prstGeom>
-            <a:noFill/>
-          </p:spPr>
-          <p:txBody>
-            <a:bodyPr wrap="none" rtlCol="0">
-              <a:spAutoFit/>
-            </a:bodyPr>
-            <a:lstStyle/>
-            <a:p>
-              <a:r>
-                <a:rPr lang="en-GB" sz="800" dirty="0" err="1"/>
-                <a:t>poleHalfGap</a:t>
-              </a:r>
-              <a:endParaRPr lang="en-GB" sz="800" dirty="0"/>
-            </a:p>
-          </p:txBody>
-        </p:sp>
-        <p:cxnSp>
-          <p:nvCxnSpPr>
-            <p:cNvPr id="223" name="Straight Arrow Connector 222"/>
-            <p:cNvCxnSpPr/>
-            <p:nvPr/>
-          </p:nvCxnSpPr>
-          <p:spPr>
-            <a:xfrm flipV="1">
-              <a:off x="4398144" y="4839164"/>
-              <a:ext cx="261453" cy="225650"/>
-            </a:xfrm>
-            <a:prstGeom prst="straightConnector1">
-              <a:avLst/>
-            </a:prstGeom>
-            <a:ln w="12700">
-              <a:solidFill>
-                <a:schemeClr val="bg1">
-                  <a:lumMod val="65000"/>
-                  <a:alpha val="50000"/>
-                </a:schemeClr>
-              </a:solidFill>
-              <a:prstDash val="sysDash"/>
-              <a:headEnd w="sm" len="sm"/>
-              <a:tailEnd type="triangle" w="sm" len="sm"/>
-            </a:ln>
-          </p:spPr>
-          <p:style>
-            <a:lnRef idx="1">
-              <a:schemeClr val="accent1"/>
-            </a:lnRef>
-            <a:fillRef idx="0">
-              <a:schemeClr val="accent1"/>
-            </a:fillRef>
-            <a:effectRef idx="0">
-              <a:schemeClr val="accent1"/>
-            </a:effectRef>
-            <a:fontRef idx="minor">
-              <a:schemeClr val="tx1"/>
-            </a:fontRef>
-          </p:style>
-        </p:cxnSp>
-      </p:grpSp>
-      <p:grpSp>
-        <p:nvGrpSpPr>
           <p:cNvPr id="13" name="Group 12"/>
           <p:cNvGrpSpPr/>
           <p:nvPr/>
         </p:nvGrpSpPr>
         <p:grpSpPr>
           <a:xfrm>
-            <a:off x="3776701" y="852034"/>
+            <a:off x="420375" y="153260"/>
             <a:ext cx="3601977" cy="1974482"/>
             <a:chOff x="3520142" y="650556"/>
             <a:chExt cx="3601977" cy="1974482"/>
@@ -7856,1621 +6140,6 @@
             <a:xfrm flipH="1" flipV="1">
               <a:off x="5374664" y="2015760"/>
               <a:ext cx="460208" cy="344363"/>
-            </a:xfrm>
-            <a:prstGeom prst="straightConnector1">
-              <a:avLst/>
-            </a:prstGeom>
-            <a:ln w="12700">
-              <a:solidFill>
-                <a:schemeClr val="bg1">
-                  <a:lumMod val="65000"/>
-                  <a:alpha val="50000"/>
-                </a:schemeClr>
-              </a:solidFill>
-              <a:prstDash val="sysDash"/>
-              <a:headEnd w="sm" len="sm"/>
-              <a:tailEnd type="triangle" w="sm" len="sm"/>
-            </a:ln>
-          </p:spPr>
-          <p:style>
-            <a:lnRef idx="1">
-              <a:schemeClr val="accent1"/>
-            </a:lnRef>
-            <a:fillRef idx="0">
-              <a:schemeClr val="accent1"/>
-            </a:fillRef>
-            <a:effectRef idx="0">
-              <a:schemeClr val="accent1"/>
-            </a:effectRef>
-            <a:fontRef idx="minor">
-              <a:schemeClr val="tx1"/>
-            </a:fontRef>
-          </p:style>
-        </p:cxnSp>
-      </p:grpSp>
-      <p:grpSp>
-        <p:nvGrpSpPr>
-          <p:cNvPr id="3" name="Group 2"/>
-          <p:cNvGrpSpPr/>
-          <p:nvPr/>
-        </p:nvGrpSpPr>
-        <p:grpSpPr>
-          <a:xfrm>
-            <a:off x="414945" y="313214"/>
-            <a:ext cx="2963506" cy="3217183"/>
-            <a:chOff x="617634" y="220222"/>
-            <a:chExt cx="2963506" cy="3217183"/>
-          </a:xfrm>
-        </p:grpSpPr>
-        <p:cxnSp>
-          <p:nvCxnSpPr>
-            <p:cNvPr id="121" name="Straight Connector 120"/>
-            <p:cNvCxnSpPr/>
-            <p:nvPr/>
-          </p:nvCxnSpPr>
-          <p:spPr>
-            <a:xfrm rot="5400000">
-              <a:off x="1632014" y="1581567"/>
-              <a:ext cx="1885659" cy="0"/>
-            </a:xfrm>
-            <a:prstGeom prst="line">
-              <a:avLst/>
-            </a:prstGeom>
-          </p:spPr>
-          <p:style>
-            <a:lnRef idx="1">
-              <a:schemeClr val="accent1"/>
-            </a:lnRef>
-            <a:fillRef idx="0">
-              <a:schemeClr val="accent1"/>
-            </a:fillRef>
-            <a:effectRef idx="0">
-              <a:schemeClr val="accent1"/>
-            </a:effectRef>
-            <a:fontRef idx="minor">
-              <a:schemeClr val="tx1"/>
-            </a:fontRef>
-          </p:style>
-        </p:cxnSp>
-        <p:cxnSp>
-          <p:nvCxnSpPr>
-            <p:cNvPr id="122" name="Straight Connector 121"/>
-            <p:cNvCxnSpPr/>
-            <p:nvPr/>
-          </p:nvCxnSpPr>
-          <p:spPr>
-            <a:xfrm rot="5400000">
-              <a:off x="2057759" y="121654"/>
-              <a:ext cx="0" cy="1034169"/>
-            </a:xfrm>
-            <a:prstGeom prst="line">
-              <a:avLst/>
-            </a:prstGeom>
-          </p:spPr>
-          <p:style>
-            <a:lnRef idx="1">
-              <a:schemeClr val="accent1"/>
-            </a:lnRef>
-            <a:fillRef idx="0">
-              <a:schemeClr val="accent1"/>
-            </a:fillRef>
-            <a:effectRef idx="0">
-              <a:schemeClr val="accent1"/>
-            </a:effectRef>
-            <a:fontRef idx="minor">
-              <a:schemeClr val="tx1"/>
-            </a:fontRef>
-          </p:style>
-        </p:cxnSp>
-        <p:cxnSp>
-          <p:nvCxnSpPr>
-            <p:cNvPr id="123" name="Straight Connector 122"/>
-            <p:cNvCxnSpPr/>
-            <p:nvPr/>
-          </p:nvCxnSpPr>
-          <p:spPr>
-            <a:xfrm rot="5400000">
-              <a:off x="2159981" y="2109535"/>
-              <a:ext cx="0" cy="829725"/>
-            </a:xfrm>
-            <a:prstGeom prst="line">
-              <a:avLst/>
-            </a:prstGeom>
-          </p:spPr>
-          <p:style>
-            <a:lnRef idx="1">
-              <a:schemeClr val="accent1"/>
-            </a:lnRef>
-            <a:fillRef idx="0">
-              <a:schemeClr val="accent1"/>
-            </a:fillRef>
-            <a:effectRef idx="0">
-              <a:schemeClr val="accent1"/>
-            </a:effectRef>
-            <a:fontRef idx="minor">
-              <a:schemeClr val="tx1"/>
-            </a:fontRef>
-          </p:style>
-        </p:cxnSp>
-        <p:cxnSp>
-          <p:nvCxnSpPr>
-            <p:cNvPr id="124" name="Straight Connector 123"/>
-            <p:cNvCxnSpPr/>
-            <p:nvPr/>
-          </p:nvCxnSpPr>
-          <p:spPr>
-            <a:xfrm>
-              <a:off x="1540674" y="220222"/>
-              <a:ext cx="0" cy="3160391"/>
-            </a:xfrm>
-            <a:prstGeom prst="line">
-              <a:avLst/>
-            </a:prstGeom>
-            <a:ln>
-              <a:solidFill>
-                <a:schemeClr val="tx1"/>
-              </a:solidFill>
-            </a:ln>
-          </p:spPr>
-          <p:style>
-            <a:lnRef idx="1">
-              <a:schemeClr val="accent1"/>
-            </a:lnRef>
-            <a:fillRef idx="0">
-              <a:schemeClr val="accent1"/>
-            </a:fillRef>
-            <a:effectRef idx="0">
-              <a:schemeClr val="accent1"/>
-            </a:effectRef>
-            <a:fontRef idx="minor">
-              <a:schemeClr val="tx1"/>
-            </a:fontRef>
-          </p:style>
-        </p:cxnSp>
-        <p:cxnSp>
-          <p:nvCxnSpPr>
-            <p:cNvPr id="125" name="Straight Connector 124"/>
-            <p:cNvCxnSpPr/>
-            <p:nvPr/>
-          </p:nvCxnSpPr>
-          <p:spPr>
-            <a:xfrm rot="5400000" flipH="1">
-              <a:off x="1426786" y="2206064"/>
-              <a:ext cx="636664" cy="0"/>
-            </a:xfrm>
-            <a:prstGeom prst="line">
-              <a:avLst/>
-            </a:prstGeom>
-          </p:spPr>
-          <p:style>
-            <a:lnRef idx="1">
-              <a:schemeClr val="accent1"/>
-            </a:lnRef>
-            <a:fillRef idx="0">
-              <a:schemeClr val="accent1"/>
-            </a:fillRef>
-            <a:effectRef idx="0">
-              <a:schemeClr val="accent1"/>
-            </a:effectRef>
-            <a:fontRef idx="minor">
-              <a:schemeClr val="tx1"/>
-            </a:fontRef>
-          </p:style>
-        </p:cxnSp>
-        <p:cxnSp>
-          <p:nvCxnSpPr>
-            <p:cNvPr id="126" name="Straight Connector 125"/>
-            <p:cNvCxnSpPr/>
-            <p:nvPr/>
-          </p:nvCxnSpPr>
-          <p:spPr>
-            <a:xfrm rot="5400000" flipV="1">
-              <a:off x="1910461" y="1722388"/>
-              <a:ext cx="0" cy="330688"/>
-            </a:xfrm>
-            <a:prstGeom prst="line">
-              <a:avLst/>
-            </a:prstGeom>
-          </p:spPr>
-          <p:style>
-            <a:lnRef idx="1">
-              <a:schemeClr val="accent1"/>
-            </a:lnRef>
-            <a:fillRef idx="0">
-              <a:schemeClr val="accent1"/>
-            </a:fillRef>
-            <a:effectRef idx="0">
-              <a:schemeClr val="accent1"/>
-            </a:effectRef>
-            <a:fontRef idx="minor">
-              <a:schemeClr val="tx1"/>
-            </a:fontRef>
-          </p:style>
-        </p:cxnSp>
-        <p:cxnSp>
-          <p:nvCxnSpPr>
-            <p:cNvPr id="127" name="Straight Connector 126"/>
-            <p:cNvCxnSpPr/>
-            <p:nvPr/>
-          </p:nvCxnSpPr>
-          <p:spPr>
-            <a:xfrm rot="5400000" flipH="1">
-              <a:off x="1709483" y="1521410"/>
-              <a:ext cx="732644" cy="0"/>
-            </a:xfrm>
-            <a:prstGeom prst="line">
-              <a:avLst/>
-            </a:prstGeom>
-          </p:spPr>
-          <p:style>
-            <a:lnRef idx="1">
-              <a:schemeClr val="accent1"/>
-            </a:lnRef>
-            <a:fillRef idx="0">
-              <a:schemeClr val="accent1"/>
-            </a:fillRef>
-            <a:effectRef idx="0">
-              <a:schemeClr val="accent1"/>
-            </a:effectRef>
-            <a:fontRef idx="minor">
-              <a:schemeClr val="tx1"/>
-            </a:fontRef>
-          </p:style>
-        </p:cxnSp>
-        <p:cxnSp>
-          <p:nvCxnSpPr>
-            <p:cNvPr id="128" name="Straight Connector 127"/>
-            <p:cNvCxnSpPr/>
-            <p:nvPr/>
-          </p:nvCxnSpPr>
-          <p:spPr>
-            <a:xfrm rot="5400000">
-              <a:off x="1808239" y="887522"/>
-              <a:ext cx="0" cy="535132"/>
-            </a:xfrm>
-            <a:prstGeom prst="line">
-              <a:avLst/>
-            </a:prstGeom>
-          </p:spPr>
-          <p:style>
-            <a:lnRef idx="1">
-              <a:schemeClr val="accent1"/>
-            </a:lnRef>
-            <a:fillRef idx="0">
-              <a:schemeClr val="accent1"/>
-            </a:fillRef>
-            <a:effectRef idx="0">
-              <a:schemeClr val="accent1"/>
-            </a:effectRef>
-            <a:fontRef idx="minor">
-              <a:schemeClr val="tx1"/>
-            </a:fontRef>
-          </p:style>
-        </p:cxnSp>
-        <p:sp>
-          <p:nvSpPr>
-            <p:cNvPr id="129" name="Rectangle 128"/>
-            <p:cNvSpPr/>
-            <p:nvPr/>
-          </p:nvSpPr>
-          <p:spPr>
-            <a:xfrm rot="5400000">
-              <a:off x="1571665" y="1413279"/>
-              <a:ext cx="586750" cy="239843"/>
-            </a:xfrm>
-            <a:prstGeom prst="rect">
-              <a:avLst/>
-            </a:prstGeom>
-            <a:solidFill>
-              <a:schemeClr val="bg1">
-                <a:lumMod val="85000"/>
-              </a:schemeClr>
-            </a:solidFill>
-            <a:ln>
-              <a:noFill/>
-            </a:ln>
-          </p:spPr>
-          <p:style>
-            <a:lnRef idx="2">
-              <a:schemeClr val="accent1">
-                <a:shade val="50000"/>
-              </a:schemeClr>
-            </a:lnRef>
-            <a:fillRef idx="1">
-              <a:schemeClr val="accent1"/>
-            </a:fillRef>
-            <a:effectRef idx="0">
-              <a:schemeClr val="accent1"/>
-            </a:effectRef>
-            <a:fontRef idx="minor">
-              <a:schemeClr val="lt1"/>
-            </a:fontRef>
-          </p:style>
-          <p:txBody>
-            <a:bodyPr rtlCol="0" anchor="ctr"/>
-            <a:lstStyle/>
-            <a:p>
-              <a:pPr algn="ctr"/>
-              <a:endParaRPr lang="en-GB"/>
-            </a:p>
-          </p:txBody>
-        </p:sp>
-        <p:sp>
-          <p:nvSpPr>
-            <p:cNvPr id="130" name="Rectangle 129"/>
-            <p:cNvSpPr/>
-            <p:nvPr/>
-          </p:nvSpPr>
-          <p:spPr>
-            <a:xfrm rot="5400000">
-              <a:off x="1572012" y="2759009"/>
-              <a:ext cx="586750" cy="239843"/>
-            </a:xfrm>
-            <a:prstGeom prst="rect">
-              <a:avLst/>
-            </a:prstGeom>
-            <a:solidFill>
-              <a:schemeClr val="bg1">
-                <a:lumMod val="85000"/>
-              </a:schemeClr>
-            </a:solidFill>
-            <a:ln>
-              <a:noFill/>
-            </a:ln>
-          </p:spPr>
-          <p:style>
-            <a:lnRef idx="2">
-              <a:schemeClr val="accent1">
-                <a:shade val="50000"/>
-              </a:schemeClr>
-            </a:lnRef>
-            <a:fillRef idx="1">
-              <a:schemeClr val="accent1"/>
-            </a:fillRef>
-            <a:effectRef idx="0">
-              <a:schemeClr val="accent1"/>
-            </a:effectRef>
-            <a:fontRef idx="minor">
-              <a:schemeClr val="lt1"/>
-            </a:fontRef>
-          </p:style>
-          <p:txBody>
-            <a:bodyPr rtlCol="0" anchor="ctr"/>
-            <a:lstStyle/>
-            <a:p>
-              <a:pPr algn="ctr"/>
-              <a:endParaRPr lang="en-GB"/>
-            </a:p>
-          </p:txBody>
-        </p:sp>
-        <p:cxnSp>
-          <p:nvCxnSpPr>
-            <p:cNvPr id="131" name="Straight Arrow Connector 130"/>
-            <p:cNvCxnSpPr/>
-            <p:nvPr/>
-          </p:nvCxnSpPr>
-          <p:spPr>
-            <a:xfrm rot="5400000">
-              <a:off x="1547055" y="2206064"/>
-              <a:ext cx="636664" cy="0"/>
-            </a:xfrm>
-            <a:prstGeom prst="straightConnector1">
-              <a:avLst/>
-            </a:prstGeom>
-            <a:ln w="12700">
-              <a:headEnd type="triangle" w="sm" len="sm"/>
-              <a:tailEnd type="triangle" w="sm" len="sm"/>
-            </a:ln>
-          </p:spPr>
-          <p:style>
-            <a:lnRef idx="1">
-              <a:schemeClr val="accent1"/>
-            </a:lnRef>
-            <a:fillRef idx="0">
-              <a:schemeClr val="accent1"/>
-            </a:fillRef>
-            <a:effectRef idx="0">
-              <a:schemeClr val="accent1"/>
-            </a:effectRef>
-            <a:fontRef idx="minor">
-              <a:schemeClr val="tx1"/>
-            </a:fontRef>
-          </p:style>
-        </p:cxnSp>
-        <p:cxnSp>
-          <p:nvCxnSpPr>
-            <p:cNvPr id="132" name="Straight Arrow Connector 131"/>
-            <p:cNvCxnSpPr/>
-            <p:nvPr/>
-          </p:nvCxnSpPr>
-          <p:spPr>
-            <a:xfrm rot="5400000">
-              <a:off x="1521388" y="2878756"/>
-              <a:ext cx="573703" cy="1"/>
-            </a:xfrm>
-            <a:prstGeom prst="straightConnector1">
-              <a:avLst/>
-            </a:prstGeom>
-            <a:ln w="12700">
-              <a:headEnd type="triangle" w="sm" len="sm"/>
-              <a:tailEnd type="triangle" w="sm" len="sm"/>
-            </a:ln>
-          </p:spPr>
-          <p:style>
-            <a:lnRef idx="1">
-              <a:schemeClr val="accent1"/>
-            </a:lnRef>
-            <a:fillRef idx="0">
-              <a:schemeClr val="accent1"/>
-            </a:fillRef>
-            <a:effectRef idx="0">
-              <a:schemeClr val="accent1"/>
-            </a:effectRef>
-            <a:fontRef idx="minor">
-              <a:schemeClr val="tx1"/>
-            </a:fontRef>
-          </p:style>
-        </p:cxnSp>
-        <p:cxnSp>
-          <p:nvCxnSpPr>
-            <p:cNvPr id="133" name="Straight Arrow Connector 132"/>
-            <p:cNvCxnSpPr/>
-            <p:nvPr/>
-          </p:nvCxnSpPr>
-          <p:spPr>
-            <a:xfrm rot="5400000">
-              <a:off x="1865386" y="3113542"/>
-              <a:ext cx="0" cy="239841"/>
-            </a:xfrm>
-            <a:prstGeom prst="straightConnector1">
-              <a:avLst/>
-            </a:prstGeom>
-            <a:ln w="12700">
-              <a:headEnd type="triangle" w="sm" len="sm"/>
-              <a:tailEnd type="triangle" w="sm" len="sm"/>
-            </a:ln>
-          </p:spPr>
-          <p:style>
-            <a:lnRef idx="1">
-              <a:schemeClr val="accent1"/>
-            </a:lnRef>
-            <a:fillRef idx="0">
-              <a:schemeClr val="accent1"/>
-            </a:fillRef>
-            <a:effectRef idx="0">
-              <a:schemeClr val="accent1"/>
-            </a:effectRef>
-            <a:fontRef idx="minor">
-              <a:schemeClr val="tx1"/>
-            </a:fontRef>
-          </p:style>
-        </p:cxnSp>
-        <p:cxnSp>
-          <p:nvCxnSpPr>
-            <p:cNvPr id="134" name="Straight Arrow Connector 133"/>
-            <p:cNvCxnSpPr/>
-            <p:nvPr/>
-          </p:nvCxnSpPr>
-          <p:spPr>
-            <a:xfrm flipH="1">
-              <a:off x="1544090" y="2057930"/>
-              <a:ext cx="201027" cy="0"/>
-            </a:xfrm>
-            <a:prstGeom prst="straightConnector1">
-              <a:avLst/>
-            </a:prstGeom>
-            <a:ln w="12700">
-              <a:headEnd type="triangle" w="sm" len="sm"/>
-              <a:tailEnd type="triangle" w="sm" len="sm"/>
-            </a:ln>
-          </p:spPr>
-          <p:style>
-            <a:lnRef idx="1">
-              <a:schemeClr val="accent1"/>
-            </a:lnRef>
-            <a:fillRef idx="0">
-              <a:schemeClr val="accent1"/>
-            </a:fillRef>
-            <a:effectRef idx="0">
-              <a:schemeClr val="accent1"/>
-            </a:effectRef>
-            <a:fontRef idx="minor">
-              <a:schemeClr val="tx1"/>
-            </a:fontRef>
-          </p:style>
-        </p:cxnSp>
-        <p:cxnSp>
-          <p:nvCxnSpPr>
-            <p:cNvPr id="135" name="Straight Connector 134"/>
-            <p:cNvCxnSpPr/>
-            <p:nvPr/>
-          </p:nvCxnSpPr>
-          <p:spPr>
-            <a:xfrm rot="5400000" flipH="1">
-              <a:off x="1788954" y="2206064"/>
-              <a:ext cx="573703" cy="0"/>
-            </a:xfrm>
-            <a:prstGeom prst="line">
-              <a:avLst/>
-            </a:prstGeom>
-            <a:ln>
-              <a:solidFill>
-                <a:schemeClr val="bg1">
-                  <a:lumMod val="65000"/>
-                </a:schemeClr>
-              </a:solidFill>
-              <a:prstDash val="dash"/>
-            </a:ln>
-          </p:spPr>
-          <p:style>
-            <a:lnRef idx="1">
-              <a:schemeClr val="accent1"/>
-            </a:lnRef>
-            <a:fillRef idx="0">
-              <a:schemeClr val="accent1"/>
-            </a:fillRef>
-            <a:effectRef idx="0">
-              <a:schemeClr val="accent1"/>
-            </a:effectRef>
-            <a:fontRef idx="minor">
-              <a:schemeClr val="tx1"/>
-            </a:fontRef>
-          </p:style>
-        </p:cxnSp>
-        <p:cxnSp>
-          <p:nvCxnSpPr>
-            <p:cNvPr id="136" name="Straight Arrow Connector 135"/>
-            <p:cNvCxnSpPr/>
-            <p:nvPr/>
-          </p:nvCxnSpPr>
-          <p:spPr>
-            <a:xfrm rot="5400000">
-              <a:off x="2328499" y="1348284"/>
-              <a:ext cx="0" cy="492688"/>
-            </a:xfrm>
-            <a:prstGeom prst="straightConnector1">
-              <a:avLst/>
-            </a:prstGeom>
-            <a:ln w="12700">
-              <a:headEnd type="triangle" w="sm" len="sm"/>
-              <a:tailEnd type="triangle" w="sm" len="sm"/>
-            </a:ln>
-          </p:spPr>
-          <p:style>
-            <a:lnRef idx="1">
-              <a:schemeClr val="accent1"/>
-            </a:lnRef>
-            <a:fillRef idx="0">
-              <a:schemeClr val="accent1"/>
-            </a:fillRef>
-            <a:effectRef idx="0">
-              <a:schemeClr val="accent1"/>
-            </a:effectRef>
-            <a:fontRef idx="minor">
-              <a:schemeClr val="tx1"/>
-            </a:fontRef>
-          </p:style>
-        </p:cxnSp>
-        <p:cxnSp>
-          <p:nvCxnSpPr>
-            <p:cNvPr id="137" name="Straight Arrow Connector 136"/>
-            <p:cNvCxnSpPr/>
-            <p:nvPr/>
-          </p:nvCxnSpPr>
-          <p:spPr>
-            <a:xfrm rot="5400000">
-              <a:off x="2057759" y="39318"/>
-              <a:ext cx="0" cy="1034169"/>
-            </a:xfrm>
-            <a:prstGeom prst="straightConnector1">
-              <a:avLst/>
-            </a:prstGeom>
-            <a:ln w="12700">
-              <a:headEnd type="triangle" w="sm" len="sm"/>
-              <a:tailEnd type="triangle" w="sm" len="sm"/>
-            </a:ln>
-          </p:spPr>
-          <p:style>
-            <a:lnRef idx="1">
-              <a:schemeClr val="accent1"/>
-            </a:lnRef>
-            <a:fillRef idx="0">
-              <a:schemeClr val="accent1"/>
-            </a:fillRef>
-            <a:effectRef idx="0">
-              <a:schemeClr val="accent1"/>
-            </a:effectRef>
-            <a:fontRef idx="minor">
-              <a:schemeClr val="tx1"/>
-            </a:fontRef>
-          </p:style>
-        </p:cxnSp>
-        <p:cxnSp>
-          <p:nvCxnSpPr>
-            <p:cNvPr id="138" name="Straight Arrow Connector 137"/>
-            <p:cNvCxnSpPr/>
-            <p:nvPr/>
-          </p:nvCxnSpPr>
-          <p:spPr>
-            <a:xfrm rot="5400000">
-              <a:off x="1828940" y="1521410"/>
-              <a:ext cx="732644" cy="0"/>
-            </a:xfrm>
-            <a:prstGeom prst="straightConnector1">
-              <a:avLst/>
-            </a:prstGeom>
-            <a:ln w="12700">
-              <a:headEnd type="triangle" w="sm" len="sm"/>
-              <a:tailEnd type="triangle" w="sm" len="sm"/>
-            </a:ln>
-          </p:spPr>
-          <p:style>
-            <a:lnRef idx="1">
-              <a:schemeClr val="accent1"/>
-            </a:lnRef>
-            <a:fillRef idx="0">
-              <a:schemeClr val="accent1"/>
-            </a:fillRef>
-            <a:effectRef idx="0">
-              <a:schemeClr val="accent1"/>
-            </a:effectRef>
-            <a:fontRef idx="minor">
-              <a:schemeClr val="tx1"/>
-            </a:fontRef>
-          </p:style>
-        </p:cxnSp>
-        <p:cxnSp>
-          <p:nvCxnSpPr>
-            <p:cNvPr id="139" name="Straight Connector 138"/>
-            <p:cNvCxnSpPr/>
-            <p:nvPr/>
-          </p:nvCxnSpPr>
-          <p:spPr>
-            <a:xfrm rot="5400000" flipV="1">
-              <a:off x="2089259" y="1532572"/>
-              <a:ext cx="0" cy="1323974"/>
-            </a:xfrm>
-            <a:prstGeom prst="line">
-              <a:avLst/>
-            </a:prstGeom>
-            <a:ln>
-              <a:solidFill>
-                <a:schemeClr val="bg1">
-                  <a:lumMod val="65000"/>
-                </a:schemeClr>
-              </a:solidFill>
-              <a:prstDash val="dash"/>
-            </a:ln>
-          </p:spPr>
-          <p:style>
-            <a:lnRef idx="1">
-              <a:schemeClr val="accent1"/>
-            </a:lnRef>
-            <a:fillRef idx="0">
-              <a:schemeClr val="accent1"/>
-            </a:fillRef>
-            <a:effectRef idx="0">
-              <a:schemeClr val="accent1"/>
-            </a:effectRef>
-            <a:fontRef idx="minor">
-              <a:schemeClr val="tx1"/>
-            </a:fontRef>
-          </p:style>
-        </p:cxnSp>
-        <p:cxnSp>
-          <p:nvCxnSpPr>
-            <p:cNvPr id="140" name="Straight Arrow Connector 139"/>
-            <p:cNvCxnSpPr/>
-            <p:nvPr/>
-          </p:nvCxnSpPr>
-          <p:spPr>
-            <a:xfrm rot="5400000">
-              <a:off x="1814088" y="802826"/>
-              <a:ext cx="0" cy="523434"/>
-            </a:xfrm>
-            <a:prstGeom prst="straightConnector1">
-              <a:avLst/>
-            </a:prstGeom>
-            <a:ln w="12700">
-              <a:headEnd type="triangle" w="sm" len="sm"/>
-              <a:tailEnd type="triangle" w="sm" len="sm"/>
-            </a:ln>
-          </p:spPr>
-          <p:style>
-            <a:lnRef idx="1">
-              <a:schemeClr val="accent1"/>
-            </a:lnRef>
-            <a:fillRef idx="0">
-              <a:schemeClr val="accent1"/>
-            </a:fillRef>
-            <a:effectRef idx="0">
-              <a:schemeClr val="accent1"/>
-            </a:effectRef>
-            <a:fontRef idx="minor">
-              <a:schemeClr val="tx1"/>
-            </a:fontRef>
-          </p:style>
-        </p:cxnSp>
-        <p:cxnSp>
-          <p:nvCxnSpPr>
-            <p:cNvPr id="141" name="Straight Connector 140"/>
-            <p:cNvCxnSpPr/>
-            <p:nvPr/>
-          </p:nvCxnSpPr>
-          <p:spPr>
-            <a:xfrm rot="5400000">
-              <a:off x="2024709" y="1326800"/>
-              <a:ext cx="0" cy="72451"/>
-            </a:xfrm>
-            <a:prstGeom prst="line">
-              <a:avLst/>
-            </a:prstGeom>
-          </p:spPr>
-          <p:style>
-            <a:lnRef idx="1">
-              <a:schemeClr val="accent1"/>
-            </a:lnRef>
-            <a:fillRef idx="0">
-              <a:schemeClr val="accent1"/>
-            </a:fillRef>
-            <a:effectRef idx="0">
-              <a:schemeClr val="accent1"/>
-            </a:effectRef>
-            <a:fontRef idx="minor">
-              <a:schemeClr val="tx1"/>
-            </a:fontRef>
-          </p:style>
-        </p:cxnSp>
-        <p:cxnSp>
-          <p:nvCxnSpPr>
-            <p:cNvPr id="142" name="Straight Connector 141"/>
-            <p:cNvCxnSpPr/>
-            <p:nvPr/>
-          </p:nvCxnSpPr>
-          <p:spPr>
-            <a:xfrm rot="5400000">
-              <a:off x="1783509" y="1857153"/>
-              <a:ext cx="61158" cy="0"/>
-            </a:xfrm>
-            <a:prstGeom prst="line">
-              <a:avLst/>
-            </a:prstGeom>
-          </p:spPr>
-          <p:style>
-            <a:lnRef idx="1">
-              <a:schemeClr val="accent1"/>
-            </a:lnRef>
-            <a:fillRef idx="0">
-              <a:schemeClr val="accent1"/>
-            </a:fillRef>
-            <a:effectRef idx="0">
-              <a:schemeClr val="accent1"/>
-            </a:effectRef>
-            <a:fontRef idx="minor">
-              <a:schemeClr val="tx1"/>
-            </a:fontRef>
-          </p:style>
-        </p:cxnSp>
-        <p:cxnSp>
-          <p:nvCxnSpPr>
-            <p:cNvPr id="143" name="Straight Arrow Connector 142"/>
-            <p:cNvCxnSpPr/>
-            <p:nvPr/>
-          </p:nvCxnSpPr>
-          <p:spPr>
-            <a:xfrm rot="5400000" flipH="1" flipV="1">
-              <a:off x="1604043" y="1143771"/>
-              <a:ext cx="194313" cy="658223"/>
-            </a:xfrm>
-            <a:prstGeom prst="straightConnector1">
-              <a:avLst/>
-            </a:prstGeom>
-            <a:ln w="12700">
-              <a:headEnd type="none" w="sm" len="sm"/>
-              <a:tailEnd type="triangle" w="sm" len="sm"/>
-            </a:ln>
-          </p:spPr>
-          <p:style>
-            <a:lnRef idx="1">
-              <a:schemeClr val="accent1"/>
-            </a:lnRef>
-            <a:fillRef idx="0">
-              <a:schemeClr val="accent1"/>
-            </a:fillRef>
-            <a:effectRef idx="0">
-              <a:schemeClr val="accent1"/>
-            </a:effectRef>
-            <a:fontRef idx="minor">
-              <a:schemeClr val="tx1"/>
-            </a:fontRef>
-          </p:style>
-        </p:cxnSp>
-        <p:cxnSp>
-          <p:nvCxnSpPr>
-            <p:cNvPr id="144" name="Straight Arrow Connector 143"/>
-            <p:cNvCxnSpPr/>
-            <p:nvPr/>
-          </p:nvCxnSpPr>
-          <p:spPr>
-            <a:xfrm rot="5400000" flipH="1" flipV="1">
-              <a:off x="1497560" y="1579320"/>
-              <a:ext cx="28743" cy="575719"/>
-            </a:xfrm>
-            <a:prstGeom prst="straightConnector1">
-              <a:avLst/>
-            </a:prstGeom>
-            <a:ln w="12700">
-              <a:headEnd type="none" w="sm" len="sm"/>
-              <a:tailEnd type="triangle" w="sm" len="sm"/>
-            </a:ln>
-          </p:spPr>
-          <p:style>
-            <a:lnRef idx="1">
-              <a:schemeClr val="accent1"/>
-            </a:lnRef>
-            <a:fillRef idx="0">
-              <a:schemeClr val="accent1"/>
-            </a:fillRef>
-            <a:effectRef idx="0">
-              <a:schemeClr val="accent1"/>
-            </a:effectRef>
-            <a:fontRef idx="minor">
-              <a:schemeClr val="tx1"/>
-            </a:fontRef>
-          </p:style>
-        </p:cxnSp>
-        <p:cxnSp>
-          <p:nvCxnSpPr>
-            <p:cNvPr id="145" name="Straight Arrow Connector 144"/>
-            <p:cNvCxnSpPr/>
-            <p:nvPr/>
-          </p:nvCxnSpPr>
-          <p:spPr>
-            <a:xfrm rot="5400000">
-              <a:off x="1585795" y="904136"/>
-              <a:ext cx="501904" cy="0"/>
-            </a:xfrm>
-            <a:prstGeom prst="straightConnector1">
-              <a:avLst/>
-            </a:prstGeom>
-            <a:ln w="12700">
-              <a:headEnd type="triangle" w="sm" len="sm"/>
-              <a:tailEnd type="triangle" w="sm" len="sm"/>
-            </a:ln>
-          </p:spPr>
-          <p:style>
-            <a:lnRef idx="1">
-              <a:schemeClr val="accent1"/>
-            </a:lnRef>
-            <a:fillRef idx="0">
-              <a:schemeClr val="accent1"/>
-            </a:fillRef>
-            <a:effectRef idx="0">
-              <a:schemeClr val="accent1"/>
-            </a:effectRef>
-            <a:fontRef idx="minor">
-              <a:schemeClr val="tx1"/>
-            </a:fontRef>
-          </p:style>
-        </p:cxnSp>
-        <p:sp>
-          <p:nvSpPr>
-            <p:cNvPr id="146" name="TextBox 145"/>
-            <p:cNvSpPr txBox="1"/>
-            <p:nvPr/>
-          </p:nvSpPr>
-          <p:spPr>
-            <a:xfrm>
-              <a:off x="2741282" y="926033"/>
-              <a:ext cx="787395" cy="215444"/>
-            </a:xfrm>
-            <a:prstGeom prst="rect">
-              <a:avLst/>
-            </a:prstGeom>
-            <a:noFill/>
-          </p:spPr>
-          <p:txBody>
-            <a:bodyPr wrap="none" rtlCol="0">
-              <a:spAutoFit/>
-            </a:bodyPr>
-            <a:lstStyle/>
-            <a:p>
-              <a:r>
-                <a:rPr lang="en-GB" sz="800"/>
-                <a:t>yokeThickness</a:t>
-              </a:r>
-              <a:endParaRPr lang="en-GB" sz="800" dirty="0"/>
-            </a:p>
-          </p:txBody>
-        </p:sp>
-        <p:sp>
-          <p:nvSpPr>
-            <p:cNvPr id="147" name="TextBox 146"/>
-            <p:cNvSpPr txBox="1"/>
-            <p:nvPr/>
-          </p:nvSpPr>
-          <p:spPr>
-            <a:xfrm>
-              <a:off x="1776071" y="698547"/>
-              <a:ext cx="787395" cy="215444"/>
-            </a:xfrm>
-            <a:prstGeom prst="rect">
-              <a:avLst/>
-            </a:prstGeom>
-            <a:noFill/>
-          </p:spPr>
-          <p:txBody>
-            <a:bodyPr wrap="none" rtlCol="0">
-              <a:spAutoFit/>
-            </a:bodyPr>
-            <a:lstStyle/>
-            <a:p>
-              <a:r>
-                <a:rPr lang="en-GB" sz="800"/>
-                <a:t>yokeThickness</a:t>
-              </a:r>
-              <a:endParaRPr lang="en-GB" sz="800" dirty="0"/>
-            </a:p>
-          </p:txBody>
-        </p:sp>
-        <p:sp>
-          <p:nvSpPr>
-            <p:cNvPr id="148" name="TextBox 147"/>
-            <p:cNvSpPr txBox="1"/>
-            <p:nvPr/>
-          </p:nvSpPr>
-          <p:spPr>
-            <a:xfrm>
-              <a:off x="1649395" y="307672"/>
-              <a:ext cx="829073" cy="215444"/>
-            </a:xfrm>
-            <a:prstGeom prst="rect">
-              <a:avLst/>
-            </a:prstGeom>
-            <a:noFill/>
-          </p:spPr>
-          <p:txBody>
-            <a:bodyPr wrap="none" rtlCol="0">
-              <a:spAutoFit/>
-            </a:bodyPr>
-            <a:lstStyle/>
-            <a:p>
-              <a:r>
-                <a:rPr lang="en-GB" sz="800" dirty="0" err="1"/>
-                <a:t>yokeHalfHeight</a:t>
-              </a:r>
-              <a:endParaRPr lang="en-GB" sz="800" dirty="0"/>
-            </a:p>
-          </p:txBody>
-        </p:sp>
-        <p:cxnSp>
-          <p:nvCxnSpPr>
-            <p:cNvPr id="149" name="Straight Arrow Connector 148"/>
-            <p:cNvCxnSpPr/>
-            <p:nvPr/>
-          </p:nvCxnSpPr>
-          <p:spPr>
-            <a:xfrm rot="5400000">
-              <a:off x="1701385" y="1581567"/>
-              <a:ext cx="1885659" cy="0"/>
-            </a:xfrm>
-            <a:prstGeom prst="straightConnector1">
-              <a:avLst/>
-            </a:prstGeom>
-            <a:ln w="12700">
-              <a:headEnd type="triangle" w="sm" len="sm"/>
-              <a:tailEnd type="triangle" w="sm" len="sm"/>
-            </a:ln>
-          </p:spPr>
-          <p:style>
-            <a:lnRef idx="1">
-              <a:schemeClr val="accent1"/>
-            </a:lnRef>
-            <a:fillRef idx="0">
-              <a:schemeClr val="accent1"/>
-            </a:fillRef>
-            <a:effectRef idx="0">
-              <a:schemeClr val="accent1"/>
-            </a:effectRef>
-            <a:fontRef idx="minor">
-              <a:schemeClr val="tx1"/>
-            </a:fontRef>
-          </p:style>
-        </p:cxnSp>
-        <p:sp>
-          <p:nvSpPr>
-            <p:cNvPr id="150" name="TextBox 149"/>
-            <p:cNvSpPr txBox="1"/>
-            <p:nvPr/>
-          </p:nvSpPr>
-          <p:spPr>
-            <a:xfrm>
-              <a:off x="2596025" y="1634874"/>
-              <a:ext cx="641522" cy="215444"/>
-            </a:xfrm>
-            <a:prstGeom prst="rect">
-              <a:avLst/>
-            </a:prstGeom>
-            <a:noFill/>
-          </p:spPr>
-          <p:txBody>
-            <a:bodyPr wrap="none" rtlCol="0">
-              <a:spAutoFit/>
-            </a:bodyPr>
-            <a:lstStyle/>
-            <a:p>
-              <a:r>
-                <a:rPr lang="en-GB" sz="800"/>
-                <a:t>yokeWidth</a:t>
-              </a:r>
-              <a:endParaRPr lang="en-GB" sz="800" dirty="0"/>
-            </a:p>
-          </p:txBody>
-        </p:sp>
-        <p:sp>
-          <p:nvSpPr>
-            <p:cNvPr id="151" name="TextBox 150"/>
-            <p:cNvSpPr txBox="1"/>
-            <p:nvPr/>
-          </p:nvSpPr>
-          <p:spPr>
-            <a:xfrm>
-              <a:off x="2017120" y="2829563"/>
-              <a:ext cx="627095" cy="215444"/>
-            </a:xfrm>
-            <a:prstGeom prst="rect">
-              <a:avLst/>
-            </a:prstGeom>
-            <a:noFill/>
-          </p:spPr>
-          <p:txBody>
-            <a:bodyPr wrap="none" rtlCol="0">
-              <a:spAutoFit/>
-            </a:bodyPr>
-            <a:lstStyle/>
-            <a:p>
-              <a:r>
-                <a:rPr lang="en-GB" sz="800" dirty="0" err="1"/>
-                <a:t>poleWidth</a:t>
-              </a:r>
-              <a:endParaRPr lang="en-GB" sz="800" dirty="0"/>
-            </a:p>
-          </p:txBody>
-        </p:sp>
-        <p:sp>
-          <p:nvSpPr>
-            <p:cNvPr id="152" name="TextBox 151"/>
-            <p:cNvSpPr txBox="1"/>
-            <p:nvPr/>
-          </p:nvSpPr>
-          <p:spPr>
-            <a:xfrm>
-              <a:off x="2458556" y="2590766"/>
-              <a:ext cx="644728" cy="215444"/>
-            </a:xfrm>
-            <a:prstGeom prst="rect">
-              <a:avLst/>
-            </a:prstGeom>
-            <a:noFill/>
-          </p:spPr>
-          <p:txBody>
-            <a:bodyPr wrap="none" rtlCol="0">
-              <a:spAutoFit/>
-            </a:bodyPr>
-            <a:lstStyle/>
-            <a:p>
-              <a:r>
-                <a:rPr lang="en-GB" sz="800" dirty="0" err="1"/>
-                <a:t>poleHeight</a:t>
-              </a:r>
-              <a:endParaRPr lang="en-GB" sz="800" dirty="0"/>
-            </a:p>
-          </p:txBody>
-        </p:sp>
-        <p:cxnSp>
-          <p:nvCxnSpPr>
-            <p:cNvPr id="153" name="Straight Arrow Connector 152"/>
-            <p:cNvCxnSpPr>
-              <a:stCxn id="151" idx="0"/>
-            </p:cNvCxnSpPr>
-            <p:nvPr/>
-          </p:nvCxnSpPr>
-          <p:spPr>
-            <a:xfrm flipH="1" flipV="1">
-              <a:off x="1890691" y="2343551"/>
-              <a:ext cx="439977" cy="486012"/>
-            </a:xfrm>
-            <a:prstGeom prst="straightConnector1">
-              <a:avLst/>
-            </a:prstGeom>
-            <a:ln w="12700">
-              <a:solidFill>
-                <a:schemeClr val="bg1">
-                  <a:lumMod val="65000"/>
-                  <a:alpha val="50000"/>
-                </a:schemeClr>
-              </a:solidFill>
-              <a:prstDash val="sysDash"/>
-              <a:headEnd w="sm" len="sm"/>
-              <a:tailEnd type="triangle" w="sm" len="sm"/>
-            </a:ln>
-          </p:spPr>
-          <p:style>
-            <a:lnRef idx="1">
-              <a:schemeClr val="accent1"/>
-            </a:lnRef>
-            <a:fillRef idx="0">
-              <a:schemeClr val="accent1"/>
-            </a:fillRef>
-            <a:effectRef idx="0">
-              <a:schemeClr val="accent1"/>
-            </a:effectRef>
-            <a:fontRef idx="minor">
-              <a:schemeClr val="tx1"/>
-            </a:fontRef>
-          </p:style>
-        </p:cxnSp>
-        <p:cxnSp>
-          <p:nvCxnSpPr>
-            <p:cNvPr id="154" name="Straight Arrow Connector 153"/>
-            <p:cNvCxnSpPr/>
-            <p:nvPr/>
-          </p:nvCxnSpPr>
-          <p:spPr>
-            <a:xfrm flipH="1" flipV="1">
-              <a:off x="1943698" y="2021302"/>
-              <a:ext cx="567866" cy="670561"/>
-            </a:xfrm>
-            <a:prstGeom prst="straightConnector1">
-              <a:avLst/>
-            </a:prstGeom>
-            <a:ln w="12700">
-              <a:solidFill>
-                <a:schemeClr val="bg1">
-                  <a:lumMod val="65000"/>
-                  <a:alpha val="50000"/>
-                </a:schemeClr>
-              </a:solidFill>
-              <a:prstDash val="sysDash"/>
-              <a:headEnd w="sm" len="sm"/>
-              <a:tailEnd type="triangle" w="sm" len="sm"/>
-            </a:ln>
-          </p:spPr>
-          <p:style>
-            <a:lnRef idx="1">
-              <a:schemeClr val="accent1"/>
-            </a:lnRef>
-            <a:fillRef idx="0">
-              <a:schemeClr val="accent1"/>
-            </a:fillRef>
-            <a:effectRef idx="0">
-              <a:schemeClr val="accent1"/>
-            </a:effectRef>
-            <a:fontRef idx="minor">
-              <a:schemeClr val="tx1"/>
-            </a:fontRef>
-          </p:style>
-        </p:cxnSp>
-        <p:sp>
-          <p:nvSpPr>
-            <p:cNvPr id="155" name="TextBox 154"/>
-            <p:cNvSpPr txBox="1"/>
-            <p:nvPr/>
-          </p:nvSpPr>
-          <p:spPr>
-            <a:xfrm>
-              <a:off x="693556" y="631207"/>
-              <a:ext cx="880369" cy="215444"/>
-            </a:xfrm>
-            <a:prstGeom prst="rect">
-              <a:avLst/>
-            </a:prstGeom>
-            <a:noFill/>
-          </p:spPr>
-          <p:txBody>
-            <a:bodyPr wrap="none" rtlCol="0">
-              <a:spAutoFit/>
-            </a:bodyPr>
-            <a:lstStyle/>
-            <a:p>
-              <a:r>
-                <a:rPr lang="en-GB" sz="800"/>
-                <a:t>yokeInnerHeight</a:t>
-              </a:r>
-              <a:endParaRPr lang="en-GB" sz="800" dirty="0"/>
-            </a:p>
-          </p:txBody>
-        </p:sp>
-        <p:cxnSp>
-          <p:nvCxnSpPr>
-            <p:cNvPr id="156" name="Straight Arrow Connector 155"/>
-            <p:cNvCxnSpPr/>
-            <p:nvPr/>
-          </p:nvCxnSpPr>
-          <p:spPr>
-            <a:xfrm rot="5400000" flipV="1">
-              <a:off x="1432230" y="748066"/>
-              <a:ext cx="198122" cy="355937"/>
-            </a:xfrm>
-            <a:prstGeom prst="straightConnector1">
-              <a:avLst/>
-            </a:prstGeom>
-            <a:ln w="12700">
-              <a:solidFill>
-                <a:schemeClr val="bg1">
-                  <a:lumMod val="65000"/>
-                  <a:alpha val="50000"/>
-                </a:schemeClr>
-              </a:solidFill>
-              <a:prstDash val="sysDash"/>
-              <a:headEnd w="sm" len="sm"/>
-              <a:tailEnd type="triangle" w="sm" len="sm"/>
-            </a:ln>
-          </p:spPr>
-          <p:style>
-            <a:lnRef idx="1">
-              <a:schemeClr val="accent1"/>
-            </a:lnRef>
-            <a:fillRef idx="0">
-              <a:schemeClr val="accent1"/>
-            </a:fillRef>
-            <a:effectRef idx="0">
-              <a:schemeClr val="accent1"/>
-            </a:effectRef>
-            <a:fontRef idx="minor">
-              <a:schemeClr val="tx1"/>
-            </a:fontRef>
-          </p:style>
-        </p:cxnSp>
-        <p:sp>
-          <p:nvSpPr>
-            <p:cNvPr id="157" name="TextBox 156"/>
-            <p:cNvSpPr txBox="1"/>
-            <p:nvPr/>
-          </p:nvSpPr>
-          <p:spPr>
-            <a:xfrm>
-              <a:off x="754787" y="1879803"/>
-              <a:ext cx="785793" cy="215444"/>
-            </a:xfrm>
-            <a:prstGeom prst="rect">
-              <a:avLst/>
-            </a:prstGeom>
-            <a:noFill/>
-          </p:spPr>
-          <p:txBody>
-            <a:bodyPr wrap="none" rtlCol="0">
-              <a:spAutoFit/>
-            </a:bodyPr>
-            <a:lstStyle/>
-            <a:p>
-              <a:r>
-                <a:rPr lang="en-GB" sz="800"/>
-                <a:t>coilToPoleGap</a:t>
-              </a:r>
-              <a:endParaRPr lang="en-GB" sz="800" dirty="0"/>
-            </a:p>
-          </p:txBody>
-        </p:sp>
-        <p:sp>
-          <p:nvSpPr>
-            <p:cNvPr id="158" name="TextBox 157"/>
-            <p:cNvSpPr txBox="1"/>
-            <p:nvPr/>
-          </p:nvSpPr>
-          <p:spPr>
-            <a:xfrm>
-              <a:off x="617634" y="1402770"/>
-              <a:ext cx="805029" cy="215444"/>
-            </a:xfrm>
-            <a:prstGeom prst="rect">
-              <a:avLst/>
-            </a:prstGeom>
-            <a:noFill/>
-          </p:spPr>
-          <p:txBody>
-            <a:bodyPr wrap="none" rtlCol="0">
-              <a:spAutoFit/>
-            </a:bodyPr>
-            <a:lstStyle/>
-            <a:p>
-              <a:r>
-                <a:rPr lang="en-GB" sz="800"/>
-                <a:t>coilToYokeGap</a:t>
-              </a:r>
-              <a:endParaRPr lang="en-GB" sz="800" dirty="0"/>
-            </a:p>
-          </p:txBody>
-        </p:sp>
-        <p:sp>
-          <p:nvSpPr>
-            <p:cNvPr id="159" name="TextBox 158"/>
-            <p:cNvSpPr txBox="1"/>
-            <p:nvPr/>
-          </p:nvSpPr>
-          <p:spPr>
-            <a:xfrm>
-              <a:off x="2780921" y="1957614"/>
-              <a:ext cx="800219" cy="215444"/>
-            </a:xfrm>
-            <a:prstGeom prst="rect">
-              <a:avLst/>
-            </a:prstGeom>
-            <a:noFill/>
-          </p:spPr>
-          <p:txBody>
-            <a:bodyPr wrap="none" rtlCol="0">
-              <a:spAutoFit/>
-            </a:bodyPr>
-            <a:lstStyle/>
-            <a:p>
-              <a:r>
-                <a:rPr lang="en-GB" sz="800"/>
-                <a:t>yokeOverHang</a:t>
-              </a:r>
-              <a:endParaRPr lang="en-GB" sz="800" dirty="0"/>
-            </a:p>
-          </p:txBody>
-        </p:sp>
-        <p:cxnSp>
-          <p:nvCxnSpPr>
-            <p:cNvPr id="160" name="Straight Arrow Connector 159"/>
-            <p:cNvCxnSpPr/>
-            <p:nvPr/>
-          </p:nvCxnSpPr>
-          <p:spPr>
-            <a:xfrm rot="5400000" flipH="1">
-              <a:off x="2393089" y="1609473"/>
-              <a:ext cx="264510" cy="584885"/>
-            </a:xfrm>
-            <a:prstGeom prst="straightConnector1">
-              <a:avLst/>
-            </a:prstGeom>
-            <a:ln w="12700">
-              <a:solidFill>
-                <a:schemeClr val="bg1">
-                  <a:lumMod val="65000"/>
-                  <a:alpha val="50000"/>
-                </a:schemeClr>
-              </a:solidFill>
-              <a:prstDash val="sysDash"/>
-              <a:headEnd w="sm" len="sm"/>
-              <a:tailEnd type="triangle" w="sm" len="sm"/>
-            </a:ln>
-          </p:spPr>
-          <p:style>
-            <a:lnRef idx="1">
-              <a:schemeClr val="accent1"/>
-            </a:lnRef>
-            <a:fillRef idx="0">
-              <a:schemeClr val="accent1"/>
-            </a:fillRef>
-            <a:effectRef idx="0">
-              <a:schemeClr val="accent1"/>
-            </a:effectRef>
-            <a:fontRef idx="minor">
-              <a:schemeClr val="tx1"/>
-            </a:fontRef>
-          </p:style>
-        </p:cxnSp>
-        <p:sp>
-          <p:nvSpPr>
-            <p:cNvPr id="161" name="TextBox 160"/>
-            <p:cNvSpPr txBox="1"/>
-            <p:nvPr/>
-          </p:nvSpPr>
-          <p:spPr>
-            <a:xfrm>
-              <a:off x="1644150" y="3221961"/>
-              <a:ext cx="606256" cy="215444"/>
-            </a:xfrm>
-            <a:prstGeom prst="rect">
-              <a:avLst/>
-            </a:prstGeom>
-            <a:noFill/>
-          </p:spPr>
-          <p:txBody>
-            <a:bodyPr wrap="none" rtlCol="0">
-              <a:spAutoFit/>
-            </a:bodyPr>
-            <a:lstStyle/>
-            <a:p>
-              <a:r>
-                <a:rPr lang="en-GB" sz="800" dirty="0" err="1"/>
-                <a:t>coilHeight</a:t>
-              </a:r>
-              <a:endParaRPr lang="en-GB" sz="800" dirty="0"/>
-            </a:p>
-          </p:txBody>
-        </p:sp>
-        <p:sp>
-          <p:nvSpPr>
-            <p:cNvPr id="162" name="TextBox 161"/>
-            <p:cNvSpPr txBox="1"/>
-            <p:nvPr/>
-          </p:nvSpPr>
-          <p:spPr>
-            <a:xfrm>
-              <a:off x="883168" y="2698447"/>
-              <a:ext cx="588623" cy="215444"/>
-            </a:xfrm>
-            <a:prstGeom prst="rect">
-              <a:avLst/>
-            </a:prstGeom>
-            <a:noFill/>
-          </p:spPr>
-          <p:txBody>
-            <a:bodyPr wrap="none" rtlCol="0">
-              <a:spAutoFit/>
-            </a:bodyPr>
-            <a:lstStyle/>
-            <a:p>
-              <a:r>
-                <a:rPr lang="en-GB" sz="800" dirty="0" err="1"/>
-                <a:t>coilWidth</a:t>
-              </a:r>
-              <a:endParaRPr lang="en-GB" sz="800" dirty="0"/>
-            </a:p>
-          </p:txBody>
-        </p:sp>
-        <p:cxnSp>
-          <p:nvCxnSpPr>
-            <p:cNvPr id="166" name="Straight Arrow Connector 165"/>
-            <p:cNvCxnSpPr>
-              <a:stCxn id="146" idx="1"/>
-            </p:cNvCxnSpPr>
-            <p:nvPr/>
-          </p:nvCxnSpPr>
-          <p:spPr>
-            <a:xfrm flipH="1">
-              <a:off x="2371877" y="1033756"/>
-              <a:ext cx="369404" cy="493397"/>
-            </a:xfrm>
-            <a:prstGeom prst="straightConnector1">
-              <a:avLst/>
-            </a:prstGeom>
-            <a:ln w="12700">
-              <a:solidFill>
-                <a:schemeClr val="bg1">
-                  <a:lumMod val="65000"/>
-                  <a:alpha val="50000"/>
-                </a:schemeClr>
-              </a:solidFill>
-              <a:prstDash val="sysDash"/>
-              <a:headEnd w="sm" len="sm"/>
-              <a:tailEnd type="triangle" w="sm" len="sm"/>
-            </a:ln>
-          </p:spPr>
-          <p:style>
-            <a:lnRef idx="1">
-              <a:schemeClr val="accent1"/>
-            </a:lnRef>
-            <a:fillRef idx="0">
-              <a:schemeClr val="accent1"/>
-            </a:fillRef>
-            <a:effectRef idx="0">
-              <a:schemeClr val="accent1"/>
-            </a:effectRef>
-            <a:fontRef idx="minor">
-              <a:schemeClr val="tx1"/>
-            </a:fontRef>
-          </p:style>
-        </p:cxnSp>
-        <p:sp>
-          <p:nvSpPr>
-            <p:cNvPr id="211" name="TextBox 210"/>
-            <p:cNvSpPr txBox="1"/>
-            <p:nvPr/>
-          </p:nvSpPr>
-          <p:spPr>
-            <a:xfrm>
-              <a:off x="649831" y="2247791"/>
-              <a:ext cx="707245" cy="215444"/>
-            </a:xfrm>
-            <a:prstGeom prst="rect">
-              <a:avLst/>
-            </a:prstGeom>
-            <a:noFill/>
-          </p:spPr>
-          <p:txBody>
-            <a:bodyPr wrap="none" rtlCol="0">
-              <a:spAutoFit/>
-            </a:bodyPr>
-            <a:lstStyle/>
-            <a:p>
-              <a:r>
-                <a:rPr lang="en-GB" sz="800" dirty="0" err="1"/>
-                <a:t>poleHalfGap</a:t>
-              </a:r>
-              <a:endParaRPr lang="en-GB" sz="800" dirty="0"/>
-            </a:p>
-          </p:txBody>
-        </p:sp>
-        <p:cxnSp>
-          <p:nvCxnSpPr>
-            <p:cNvPr id="212" name="Straight Arrow Connector 211"/>
-            <p:cNvCxnSpPr/>
-            <p:nvPr/>
-          </p:nvCxnSpPr>
-          <p:spPr>
-            <a:xfrm flipV="1">
-              <a:off x="1306144" y="2079206"/>
-              <a:ext cx="346101" cy="233348"/>
-            </a:xfrm>
-            <a:prstGeom prst="straightConnector1">
-              <a:avLst/>
-            </a:prstGeom>
-            <a:ln w="12700">
-              <a:solidFill>
-                <a:schemeClr val="bg1">
-                  <a:lumMod val="65000"/>
-                  <a:alpha val="50000"/>
-                </a:schemeClr>
-              </a:solidFill>
-              <a:prstDash val="sysDash"/>
-              <a:headEnd w="sm" len="sm"/>
-              <a:tailEnd type="triangle" w="sm" len="sm"/>
-            </a:ln>
-          </p:spPr>
-          <p:style>
-            <a:lnRef idx="1">
-              <a:schemeClr val="accent1"/>
-            </a:lnRef>
-            <a:fillRef idx="0">
-              <a:schemeClr val="accent1"/>
-            </a:fillRef>
-            <a:effectRef idx="0">
-              <a:schemeClr val="accent1"/>
-            </a:effectRef>
-            <a:fontRef idx="minor">
-              <a:schemeClr val="tx1"/>
-            </a:fontRef>
-          </p:style>
-        </p:cxnSp>
-        <p:cxnSp>
-          <p:nvCxnSpPr>
-            <p:cNvPr id="229" name="Straight Arrow Connector 228"/>
-            <p:cNvCxnSpPr/>
-            <p:nvPr/>
-          </p:nvCxnSpPr>
-          <p:spPr>
-            <a:xfrm flipH="1">
-              <a:off x="1748642" y="1994785"/>
-              <a:ext cx="312293" cy="0"/>
-            </a:xfrm>
-            <a:prstGeom prst="straightConnector1">
-              <a:avLst/>
-            </a:prstGeom>
-            <a:ln w="12700">
-              <a:headEnd type="triangle" w="sm" len="sm"/>
-              <a:tailEnd type="triangle" w="sm" len="sm"/>
-            </a:ln>
-          </p:spPr>
-          <p:style>
-            <a:lnRef idx="1">
-              <a:schemeClr val="accent1"/>
-            </a:lnRef>
-            <a:fillRef idx="0">
-              <a:schemeClr val="accent1"/>
-            </a:fillRef>
-            <a:effectRef idx="0">
-              <a:schemeClr val="accent1"/>
-            </a:effectRef>
-            <a:fontRef idx="minor">
-              <a:schemeClr val="tx1"/>
-            </a:fontRef>
-          </p:style>
-        </p:cxnSp>
-        <p:cxnSp>
-          <p:nvCxnSpPr>
-            <p:cNvPr id="230" name="Straight Arrow Connector 229"/>
-            <p:cNvCxnSpPr/>
-            <p:nvPr/>
-          </p:nvCxnSpPr>
-          <p:spPr>
-            <a:xfrm flipV="1">
-              <a:off x="1402541" y="2719450"/>
-              <a:ext cx="355499" cy="110188"/>
             </a:xfrm>
             <a:prstGeom prst="straightConnector1">
               <a:avLst/>

</xml_diff>